<commit_message>
Improve valid tiling diagram
</commit_message>
<xml_diff>
--- a/docs/MICRO 2022/figures/TileShapesSize3.pptx
+++ b/docs/MICRO 2022/figures/TileShapesSize3.pptx
@@ -4834,1749 +4834,1644 @@
           <a:chExt cx="0" cy="0"/>
         </a:xfrm>
       </p:grpSpPr>
-      <p:grpSp>
-        <p:nvGrpSpPr>
-          <p:cNvPr id="47" name="Group 46">
-            <a:extLst>
-              <a:ext uri="{FF2B5EF4-FFF2-40B4-BE49-F238E27FC236}">
-                <a16:creationId xmlns:a16="http://schemas.microsoft.com/office/drawing/2014/main" id="{B6033604-0191-4756-AAE7-50A2376E147C}"/>
-              </a:ext>
-            </a:extLst>
-          </p:cNvPr>
-          <p:cNvGrpSpPr/>
+      <p:sp>
+        <p:nvSpPr>
+          <p:cNvPr id="19" name="Oval 18">
+            <a:extLst>
+              <a:ext uri="{FF2B5EF4-FFF2-40B4-BE49-F238E27FC236}">
+                <a16:creationId xmlns:a16="http://schemas.microsoft.com/office/drawing/2014/main" id="{5DBE051D-5AC6-428D-B59E-DB68EE3D3D21}"/>
+              </a:ext>
+            </a:extLst>
+          </p:cNvPr>
+          <p:cNvSpPr/>
           <p:nvPr/>
-        </p:nvGrpSpPr>
-        <p:grpSpPr>
+        </p:nvSpPr>
+        <p:spPr>
+          <a:xfrm rot="3559613">
+            <a:off x="2471407" y="28548"/>
+            <a:ext cx="1486445" cy="4971087"/>
+          </a:xfrm>
+          <a:prstGeom prst="ellipse">
+            <a:avLst/>
+          </a:prstGeom>
+          <a:noFill/>
+          <a:ln w="73025">
+            <a:solidFill>
+              <a:schemeClr val="accent6">
+                <a:lumMod val="60000"/>
+                <a:lumOff val="40000"/>
+              </a:schemeClr>
+            </a:solidFill>
+          </a:ln>
+        </p:spPr>
+        <p:style>
+          <a:lnRef idx="2">
+            <a:schemeClr val="accent1">
+              <a:shade val="50000"/>
+            </a:schemeClr>
+          </a:lnRef>
+          <a:fillRef idx="1">
+            <a:schemeClr val="accent1"/>
+          </a:fillRef>
+          <a:effectRef idx="0">
+            <a:schemeClr val="accent1"/>
+          </a:effectRef>
+          <a:fontRef idx="minor">
+            <a:schemeClr val="lt1"/>
+          </a:fontRef>
+        </p:style>
+        <p:txBody>
+          <a:bodyPr rtlCol="0" anchor="ctr"/>
+          <a:lstStyle/>
+          <a:p>
+            <a:pPr algn="ctr"/>
+            <a:endParaRPr lang="en-IN"/>
+          </a:p>
+        </p:txBody>
+      </p:sp>
+      <p:sp>
+        <p:nvSpPr>
+          <p:cNvPr id="43" name="Isosceles Triangle 42">
+            <a:extLst>
+              <a:ext uri="{FF2B5EF4-FFF2-40B4-BE49-F238E27FC236}">
+                <a16:creationId xmlns:a16="http://schemas.microsoft.com/office/drawing/2014/main" id="{F2E86EA5-8F04-456A-A7C3-0FF608424FDD}"/>
+              </a:ext>
+            </a:extLst>
+          </p:cNvPr>
+          <p:cNvSpPr/>
+          <p:nvPr/>
+        </p:nvSpPr>
+        <p:spPr>
           <a:xfrm>
-            <a:off x="848927" y="1269858"/>
-            <a:ext cx="7520143" cy="4318284"/>
-            <a:chOff x="553652" y="654188"/>
-            <a:chExt cx="7520143" cy="4318284"/>
-          </a:xfrm>
-        </p:grpSpPr>
-        <p:sp>
-          <p:nvSpPr>
-            <p:cNvPr id="19" name="Oval 18">
-              <a:extLst>
-                <a:ext uri="{FF2B5EF4-FFF2-40B4-BE49-F238E27FC236}">
-                  <a16:creationId xmlns:a16="http://schemas.microsoft.com/office/drawing/2014/main" id="{5DBE051D-5AC6-428D-B59E-DB68EE3D3D21}"/>
-                </a:ext>
-              </a:extLst>
-            </p:cNvPr>
-            <p:cNvSpPr/>
-            <p:nvPr/>
-          </p:nvSpPr>
-          <p:spPr>
-            <a:xfrm rot="3030683">
-              <a:off x="2295973" y="-430327"/>
-              <a:ext cx="1486445" cy="4971087"/>
-            </a:xfrm>
-            <a:prstGeom prst="ellipse">
-              <a:avLst/>
-            </a:prstGeom>
-            <a:noFill/>
-            <a:ln w="73025">
+            <a:off x="4529924" y="1637908"/>
+            <a:ext cx="3722702" cy="2279876"/>
+          </a:xfrm>
+          <a:prstGeom prst="triangle">
+            <a:avLst/>
+          </a:prstGeom>
+          <a:noFill/>
+          <a:ln w="73025">
+            <a:solidFill>
+              <a:schemeClr val="accent5">
+                <a:lumMod val="60000"/>
+                <a:lumOff val="40000"/>
+              </a:schemeClr>
+            </a:solidFill>
+          </a:ln>
+        </p:spPr>
+        <p:style>
+          <a:lnRef idx="2">
+            <a:schemeClr val="accent1">
+              <a:shade val="50000"/>
+            </a:schemeClr>
+          </a:lnRef>
+          <a:fillRef idx="1">
+            <a:schemeClr val="accent1"/>
+          </a:fillRef>
+          <a:effectRef idx="0">
+            <a:schemeClr val="accent1"/>
+          </a:effectRef>
+          <a:fontRef idx="minor">
+            <a:schemeClr val="lt1"/>
+          </a:fontRef>
+        </p:style>
+        <p:txBody>
+          <a:bodyPr rtlCol="0" anchor="ctr"/>
+          <a:lstStyle/>
+          <a:p>
+            <a:pPr algn="ctr"/>
+            <a:endParaRPr lang="en-IN"/>
+          </a:p>
+        </p:txBody>
+      </p:sp>
+      <p:sp>
+        <p:nvSpPr>
+          <p:cNvPr id="5" name="Oval 4">
+            <a:extLst>
+              <a:ext uri="{FF2B5EF4-FFF2-40B4-BE49-F238E27FC236}">
+                <a16:creationId xmlns:a16="http://schemas.microsoft.com/office/drawing/2014/main" id="{6950DDE1-1936-44E0-B70A-3F44CC03482E}"/>
+              </a:ext>
+            </a:extLst>
+          </p:cNvPr>
+          <p:cNvSpPr>
+            <a:spLocks noChangeAspect="1"/>
+          </p:cNvSpPr>
+          <p:nvPr/>
+        </p:nvSpPr>
+        <p:spPr>
+          <a:xfrm>
+            <a:off x="4534738" y="1269858"/>
+            <a:ext cx="503150" cy="503150"/>
+          </a:xfrm>
+          <a:prstGeom prst="ellipse">
+            <a:avLst/>
+          </a:prstGeom>
+          <a:noFill/>
+          <a:ln w="38100">
+            <a:solidFill>
+              <a:schemeClr val="tx1"/>
+            </a:solidFill>
+          </a:ln>
+        </p:spPr>
+        <p:style>
+          <a:lnRef idx="2">
+            <a:schemeClr val="accent1">
+              <a:shade val="50000"/>
+            </a:schemeClr>
+          </a:lnRef>
+          <a:fillRef idx="1">
+            <a:schemeClr val="accent1"/>
+          </a:fillRef>
+          <a:effectRef idx="0">
+            <a:schemeClr val="accent1"/>
+          </a:effectRef>
+          <a:fontRef idx="minor">
+            <a:schemeClr val="lt1"/>
+          </a:fontRef>
+        </p:style>
+        <p:txBody>
+          <a:bodyPr rtlCol="0" anchor="ctr"/>
+          <a:lstStyle/>
+          <a:p>
+            <a:pPr algn="ctr"/>
+            <a:r>
+              <a:rPr lang="en-US" sz="2000" b="1" dirty="0">
+                <a:solidFill>
+                  <a:prstClr val="black"/>
+                </a:solidFill>
+                <a:latin typeface="Calibri" panose="020F0502020204030204"/>
+              </a:rPr>
+              <a:t>0</a:t>
+            </a:r>
+            <a:endParaRPr lang="en-IN" sz="2000" b="1" dirty="0">
+              <a:solidFill>
+                <a:prstClr val="black"/>
+              </a:solidFill>
+              <a:latin typeface="Calibri" panose="020F0502020204030204"/>
+            </a:endParaRPr>
+          </a:p>
+        </p:txBody>
+      </p:sp>
+      <p:sp>
+        <p:nvSpPr>
+          <p:cNvPr id="6" name="Oval 5">
+            <a:extLst>
+              <a:ext uri="{FF2B5EF4-FFF2-40B4-BE49-F238E27FC236}">
+                <a16:creationId xmlns:a16="http://schemas.microsoft.com/office/drawing/2014/main" id="{2D1C4D35-DB8A-4E83-9F27-D6C971F6F941}"/>
+              </a:ext>
+            </a:extLst>
+          </p:cNvPr>
+          <p:cNvSpPr>
+            <a:spLocks noChangeAspect="1"/>
+          </p:cNvSpPr>
+          <p:nvPr/>
+        </p:nvSpPr>
+        <p:spPr>
+          <a:xfrm>
+            <a:off x="2671710" y="2063991"/>
+            <a:ext cx="503150" cy="503150"/>
+          </a:xfrm>
+          <a:prstGeom prst="ellipse">
+            <a:avLst/>
+          </a:prstGeom>
+          <a:noFill/>
+          <a:ln w="38100">
+            <a:solidFill>
+              <a:schemeClr val="tx1"/>
+            </a:solidFill>
+          </a:ln>
+        </p:spPr>
+        <p:style>
+          <a:lnRef idx="2">
+            <a:schemeClr val="accent1">
+              <a:shade val="50000"/>
+            </a:schemeClr>
+          </a:lnRef>
+          <a:fillRef idx="1">
+            <a:schemeClr val="accent1"/>
+          </a:fillRef>
+          <a:effectRef idx="0">
+            <a:schemeClr val="accent1"/>
+          </a:effectRef>
+          <a:fontRef idx="minor">
+            <a:schemeClr val="lt1"/>
+          </a:fontRef>
+        </p:style>
+        <p:txBody>
+          <a:bodyPr rtlCol="0" anchor="ctr"/>
+          <a:lstStyle/>
+          <a:p>
+            <a:pPr algn="ctr"/>
+            <a:r>
+              <a:rPr lang="en-US" sz="2000" b="1" dirty="0">
+                <a:solidFill>
+                  <a:prstClr val="black"/>
+                </a:solidFill>
+                <a:latin typeface="Calibri" panose="020F0502020204030204"/>
+              </a:rPr>
+              <a:t>1</a:t>
+            </a:r>
+            <a:endParaRPr lang="en-IN" sz="2000" b="1" dirty="0">
+              <a:solidFill>
+                <a:prstClr val="black"/>
+              </a:solidFill>
+              <a:latin typeface="Calibri" panose="020F0502020204030204"/>
+            </a:endParaRPr>
+          </a:p>
+        </p:txBody>
+      </p:sp>
+      <p:sp>
+        <p:nvSpPr>
+          <p:cNvPr id="7" name="Oval 6">
+            <a:extLst>
+              <a:ext uri="{FF2B5EF4-FFF2-40B4-BE49-F238E27FC236}">
+                <a16:creationId xmlns:a16="http://schemas.microsoft.com/office/drawing/2014/main" id="{70593105-077C-4CD5-936C-20031FE25E42}"/>
+              </a:ext>
+            </a:extLst>
+          </p:cNvPr>
+          <p:cNvSpPr>
+            <a:spLocks noChangeAspect="1"/>
+          </p:cNvSpPr>
+          <p:nvPr/>
+        </p:nvSpPr>
+        <p:spPr>
+          <a:xfrm>
+            <a:off x="1697177" y="3251479"/>
+            <a:ext cx="503150" cy="503150"/>
+          </a:xfrm>
+          <a:prstGeom prst="ellipse">
+            <a:avLst/>
+          </a:prstGeom>
+          <a:noFill/>
+          <a:ln w="38100">
+            <a:solidFill>
+              <a:schemeClr val="tx1"/>
+            </a:solidFill>
+          </a:ln>
+        </p:spPr>
+        <p:style>
+          <a:lnRef idx="2">
+            <a:schemeClr val="accent1">
+              <a:shade val="50000"/>
+            </a:schemeClr>
+          </a:lnRef>
+          <a:fillRef idx="1">
+            <a:schemeClr val="accent1"/>
+          </a:fillRef>
+          <a:effectRef idx="0">
+            <a:schemeClr val="accent1"/>
+          </a:effectRef>
+          <a:fontRef idx="minor">
+            <a:schemeClr val="lt1"/>
+          </a:fontRef>
+        </p:style>
+        <p:txBody>
+          <a:bodyPr rtlCol="0" anchor="ctr"/>
+          <a:lstStyle/>
+          <a:p>
+            <a:pPr algn="ctr"/>
+            <a:r>
+              <a:rPr lang="en-US" sz="2000" b="1" dirty="0">
+                <a:solidFill>
+                  <a:prstClr val="black"/>
+                </a:solidFill>
+                <a:latin typeface="Calibri" panose="020F0502020204030204"/>
+              </a:rPr>
+              <a:t>2</a:t>
+            </a:r>
+            <a:endParaRPr lang="en-IN" sz="2000" b="1" dirty="0">
+              <a:solidFill>
+                <a:prstClr val="black"/>
+              </a:solidFill>
+              <a:latin typeface="Calibri" panose="020F0502020204030204"/>
+            </a:endParaRPr>
+          </a:p>
+        </p:txBody>
+      </p:sp>
+      <p:cxnSp>
+        <p:nvCxnSpPr>
+          <p:cNvPr id="8" name="Straight Connector 7">
+            <a:extLst>
+              <a:ext uri="{FF2B5EF4-FFF2-40B4-BE49-F238E27FC236}">
+                <a16:creationId xmlns:a16="http://schemas.microsoft.com/office/drawing/2014/main" id="{11B69B95-DD16-42A8-8719-43DFCFA18D09}"/>
+              </a:ext>
+            </a:extLst>
+          </p:cNvPr>
+          <p:cNvCxnSpPr>
+            <a:cxnSpLocks/>
+            <a:stCxn id="5" idx="3"/>
+            <a:endCxn id="6" idx="7"/>
+          </p:cNvCxnSpPr>
+          <p:nvPr/>
+        </p:nvCxnSpPr>
+        <p:spPr>
+          <a:xfrm flipH="1">
+            <a:off x="3101175" y="1699323"/>
+            <a:ext cx="1507248" cy="438353"/>
+          </a:xfrm>
+          <a:prstGeom prst="line">
+            <a:avLst/>
+          </a:prstGeom>
+          <a:ln w="38100">
+            <a:solidFill>
+              <a:schemeClr val="bg2">
+                <a:lumMod val="90000"/>
+              </a:schemeClr>
+            </a:solidFill>
+          </a:ln>
+        </p:spPr>
+        <p:style>
+          <a:lnRef idx="1">
+            <a:schemeClr val="accent1"/>
+          </a:lnRef>
+          <a:fillRef idx="0">
+            <a:schemeClr val="accent1"/>
+          </a:fillRef>
+          <a:effectRef idx="0">
+            <a:schemeClr val="accent1"/>
+          </a:effectRef>
+          <a:fontRef idx="minor">
+            <a:schemeClr val="tx1"/>
+          </a:fontRef>
+        </p:style>
+      </p:cxnSp>
+      <p:cxnSp>
+        <p:nvCxnSpPr>
+          <p:cNvPr id="9" name="Straight Connector 8">
+            <a:extLst>
+              <a:ext uri="{FF2B5EF4-FFF2-40B4-BE49-F238E27FC236}">
+                <a16:creationId xmlns:a16="http://schemas.microsoft.com/office/drawing/2014/main" id="{969384A7-42A0-4A26-8046-3C89583E9B29}"/>
+              </a:ext>
+            </a:extLst>
+          </p:cNvPr>
+          <p:cNvCxnSpPr>
+            <a:cxnSpLocks/>
+            <a:stCxn id="6" idx="3"/>
+            <a:endCxn id="7" idx="0"/>
+          </p:cNvCxnSpPr>
+          <p:nvPr/>
+        </p:nvCxnSpPr>
+        <p:spPr>
+          <a:xfrm flipH="1">
+            <a:off x="1948752" y="2493456"/>
+            <a:ext cx="796643" cy="758023"/>
+          </a:xfrm>
+          <a:prstGeom prst="line">
+            <a:avLst/>
+          </a:prstGeom>
+          <a:ln w="38100">
+            <a:solidFill>
+              <a:schemeClr val="bg2">
+                <a:lumMod val="90000"/>
+              </a:schemeClr>
+            </a:solidFill>
+          </a:ln>
+        </p:spPr>
+        <p:style>
+          <a:lnRef idx="1">
+            <a:schemeClr val="accent1"/>
+          </a:lnRef>
+          <a:fillRef idx="0">
+            <a:schemeClr val="accent1"/>
+          </a:fillRef>
+          <a:effectRef idx="0">
+            <a:schemeClr val="accent1"/>
+          </a:effectRef>
+          <a:fontRef idx="minor">
+            <a:schemeClr val="tx1"/>
+          </a:fontRef>
+        </p:style>
+      </p:cxnSp>
+      <p:sp>
+        <p:nvSpPr>
+          <p:cNvPr id="10" name="Oval 9">
+            <a:extLst>
+              <a:ext uri="{FF2B5EF4-FFF2-40B4-BE49-F238E27FC236}">
+                <a16:creationId xmlns:a16="http://schemas.microsoft.com/office/drawing/2014/main" id="{05B8F7F1-E5B8-41BA-A287-1066237B9FF0}"/>
+              </a:ext>
+            </a:extLst>
+          </p:cNvPr>
+          <p:cNvSpPr>
+            <a:spLocks noChangeAspect="1"/>
+          </p:cNvSpPr>
+          <p:nvPr/>
+        </p:nvSpPr>
+        <p:spPr>
+          <a:xfrm>
+            <a:off x="3671835" y="3247400"/>
+            <a:ext cx="503150" cy="503150"/>
+          </a:xfrm>
+          <a:prstGeom prst="ellipse">
+            <a:avLst/>
+          </a:prstGeom>
+          <a:noFill/>
+          <a:ln w="38100">
+            <a:solidFill>
+              <a:schemeClr val="tx1"/>
+            </a:solidFill>
+          </a:ln>
+        </p:spPr>
+        <p:style>
+          <a:lnRef idx="2">
+            <a:schemeClr val="accent1">
+              <a:shade val="50000"/>
+            </a:schemeClr>
+          </a:lnRef>
+          <a:fillRef idx="1">
+            <a:schemeClr val="accent1"/>
+          </a:fillRef>
+          <a:effectRef idx="0">
+            <a:schemeClr val="accent1"/>
+          </a:effectRef>
+          <a:fontRef idx="minor">
+            <a:schemeClr val="lt1"/>
+          </a:fontRef>
+        </p:style>
+        <p:txBody>
+          <a:bodyPr rtlCol="0" anchor="ctr"/>
+          <a:lstStyle/>
+          <a:p>
+            <a:pPr algn="ctr"/>
+            <a:r>
+              <a:rPr lang="en-US" sz="2000" b="1" dirty="0">
+                <a:solidFill>
+                  <a:prstClr val="black"/>
+                </a:solidFill>
+                <a:latin typeface="Calibri" panose="020F0502020204030204"/>
+              </a:rPr>
+              <a:t>l</a:t>
+            </a:r>
+            <a:r>
+              <a:rPr lang="en-US" sz="2000" b="1" baseline="-25000" dirty="0">
+                <a:solidFill>
+                  <a:prstClr val="black"/>
+                </a:solidFill>
+                <a:latin typeface="Calibri" panose="020F0502020204030204"/>
+              </a:rPr>
+              <a:t>3</a:t>
+            </a:r>
+            <a:endParaRPr lang="en-IN" sz="1400" baseline="-25000" dirty="0"/>
+          </a:p>
+        </p:txBody>
+      </p:sp>
+      <p:cxnSp>
+        <p:nvCxnSpPr>
+          <p:cNvPr id="11" name="Straight Connector 10">
+            <a:extLst>
+              <a:ext uri="{FF2B5EF4-FFF2-40B4-BE49-F238E27FC236}">
+                <a16:creationId xmlns:a16="http://schemas.microsoft.com/office/drawing/2014/main" id="{8734530F-2937-4F56-B68F-097FD44A3723}"/>
+              </a:ext>
+            </a:extLst>
+          </p:cNvPr>
+          <p:cNvCxnSpPr>
+            <a:cxnSpLocks/>
+            <a:stCxn id="6" idx="5"/>
+            <a:endCxn id="10" idx="0"/>
+          </p:cNvCxnSpPr>
+          <p:nvPr/>
+        </p:nvCxnSpPr>
+        <p:spPr>
+          <a:xfrm>
+            <a:off x="3101175" y="2493456"/>
+            <a:ext cx="822235" cy="753944"/>
+          </a:xfrm>
+          <a:prstGeom prst="line">
+            <a:avLst/>
+          </a:prstGeom>
+          <a:ln w="38100">
+            <a:solidFill>
+              <a:schemeClr val="bg2">
+                <a:lumMod val="90000"/>
+              </a:schemeClr>
+            </a:solidFill>
+          </a:ln>
+        </p:spPr>
+        <p:style>
+          <a:lnRef idx="1">
+            <a:schemeClr val="accent1"/>
+          </a:lnRef>
+          <a:fillRef idx="0">
+            <a:schemeClr val="accent1"/>
+          </a:fillRef>
+          <a:effectRef idx="0">
+            <a:schemeClr val="accent1"/>
+          </a:effectRef>
+          <a:fontRef idx="minor">
+            <a:schemeClr val="tx1"/>
+          </a:fontRef>
+        </p:style>
+      </p:cxnSp>
+      <p:sp>
+        <p:nvSpPr>
+          <p:cNvPr id="20" name="Oval 19">
+            <a:extLst>
+              <a:ext uri="{FF2B5EF4-FFF2-40B4-BE49-F238E27FC236}">
+                <a16:creationId xmlns:a16="http://schemas.microsoft.com/office/drawing/2014/main" id="{9AE2D35E-CEDA-4EF3-AB04-CCB301B5331C}"/>
+              </a:ext>
+            </a:extLst>
+          </p:cNvPr>
+          <p:cNvSpPr>
+            <a:spLocks noChangeAspect="1"/>
+          </p:cNvSpPr>
+          <p:nvPr/>
+        </p:nvSpPr>
+        <p:spPr>
+          <a:xfrm>
+            <a:off x="967049" y="4322992"/>
+            <a:ext cx="503150" cy="503150"/>
+          </a:xfrm>
+          <a:prstGeom prst="ellipse">
+            <a:avLst/>
+          </a:prstGeom>
+          <a:noFill/>
+          <a:ln w="38100">
+            <a:solidFill>
+              <a:schemeClr val="tx1"/>
+            </a:solidFill>
+          </a:ln>
+        </p:spPr>
+        <p:style>
+          <a:lnRef idx="2">
+            <a:schemeClr val="accent1">
+              <a:shade val="50000"/>
+            </a:schemeClr>
+          </a:lnRef>
+          <a:fillRef idx="1">
+            <a:schemeClr val="accent1"/>
+          </a:fillRef>
+          <a:effectRef idx="0">
+            <a:schemeClr val="accent1"/>
+          </a:effectRef>
+          <a:fontRef idx="minor">
+            <a:schemeClr val="lt1"/>
+          </a:fontRef>
+        </p:style>
+        <p:txBody>
+          <a:bodyPr rtlCol="0" anchor="ctr"/>
+          <a:lstStyle/>
+          <a:p>
+            <a:pPr algn="ctr"/>
+            <a:r>
+              <a:rPr lang="en-US" sz="2000" b="1" dirty="0">
+                <a:solidFill>
+                  <a:prstClr val="black"/>
+                </a:solidFill>
+                <a:latin typeface="Calibri" panose="020F0502020204030204"/>
+              </a:rPr>
+              <a:t>l</a:t>
+            </a:r>
+            <a:r>
+              <a:rPr lang="en-US" sz="2000" b="1" baseline="-25000" dirty="0">
+                <a:solidFill>
+                  <a:prstClr val="black"/>
+                </a:solidFill>
+                <a:latin typeface="Calibri" panose="020F0502020204030204"/>
+              </a:rPr>
+              <a:t>1</a:t>
+            </a:r>
+            <a:endParaRPr lang="en-IN" sz="1400" baseline="-25000" dirty="0"/>
+          </a:p>
+        </p:txBody>
+      </p:sp>
+      <p:cxnSp>
+        <p:nvCxnSpPr>
+          <p:cNvPr id="21" name="Straight Connector 20">
+            <a:extLst>
+              <a:ext uri="{FF2B5EF4-FFF2-40B4-BE49-F238E27FC236}">
+                <a16:creationId xmlns:a16="http://schemas.microsoft.com/office/drawing/2014/main" id="{D304E2D1-CA82-47D1-A903-A9CF0345045C}"/>
+              </a:ext>
+            </a:extLst>
+          </p:cNvPr>
+          <p:cNvCxnSpPr>
+            <a:cxnSpLocks/>
+            <a:stCxn id="7" idx="3"/>
+            <a:endCxn id="20" idx="0"/>
+          </p:cNvCxnSpPr>
+          <p:nvPr/>
+        </p:nvCxnSpPr>
+        <p:spPr>
+          <a:xfrm flipH="1">
+            <a:off x="1218624" y="3680944"/>
+            <a:ext cx="552238" cy="642048"/>
+          </a:xfrm>
+          <a:prstGeom prst="line">
+            <a:avLst/>
+          </a:prstGeom>
+          <a:ln w="38100">
+            <a:solidFill>
+              <a:schemeClr val="bg2">
+                <a:lumMod val="90000"/>
+              </a:schemeClr>
+            </a:solidFill>
+          </a:ln>
+        </p:spPr>
+        <p:style>
+          <a:lnRef idx="1">
+            <a:schemeClr val="accent1"/>
+          </a:lnRef>
+          <a:fillRef idx="0">
+            <a:schemeClr val="accent1"/>
+          </a:fillRef>
+          <a:effectRef idx="0">
+            <a:schemeClr val="accent1"/>
+          </a:effectRef>
+          <a:fontRef idx="minor">
+            <a:schemeClr val="tx1"/>
+          </a:fontRef>
+        </p:style>
+      </p:cxnSp>
+      <p:sp>
+        <p:nvSpPr>
+          <p:cNvPr id="12" name="Oval 11">
+            <a:extLst>
+              <a:ext uri="{FF2B5EF4-FFF2-40B4-BE49-F238E27FC236}">
+                <a16:creationId xmlns:a16="http://schemas.microsoft.com/office/drawing/2014/main" id="{61787934-1776-47B1-9A82-88D991D01AB8}"/>
+              </a:ext>
+            </a:extLst>
+          </p:cNvPr>
+          <p:cNvSpPr>
+            <a:spLocks noChangeAspect="1"/>
+          </p:cNvSpPr>
+          <p:nvPr/>
+        </p:nvSpPr>
+        <p:spPr>
+          <a:xfrm>
+            <a:off x="2322370" y="4322992"/>
+            <a:ext cx="503150" cy="503150"/>
+          </a:xfrm>
+          <a:prstGeom prst="ellipse">
+            <a:avLst/>
+          </a:prstGeom>
+          <a:noFill/>
+          <a:ln w="38100">
+            <a:solidFill>
+              <a:schemeClr val="tx1"/>
+            </a:solidFill>
+          </a:ln>
+        </p:spPr>
+        <p:style>
+          <a:lnRef idx="2">
+            <a:schemeClr val="accent1">
+              <a:shade val="50000"/>
+            </a:schemeClr>
+          </a:lnRef>
+          <a:fillRef idx="1">
+            <a:schemeClr val="accent1"/>
+          </a:fillRef>
+          <a:effectRef idx="0">
+            <a:schemeClr val="accent1"/>
+          </a:effectRef>
+          <a:fontRef idx="minor">
+            <a:schemeClr val="lt1"/>
+          </a:fontRef>
+        </p:style>
+        <p:txBody>
+          <a:bodyPr rtlCol="0" anchor="ctr"/>
+          <a:lstStyle/>
+          <a:p>
+            <a:pPr algn="ctr"/>
+            <a:r>
+              <a:rPr lang="en-US" sz="2000" b="1" dirty="0">
+                <a:solidFill>
+                  <a:prstClr val="black"/>
+                </a:solidFill>
+                <a:latin typeface="Calibri" panose="020F0502020204030204"/>
+              </a:rPr>
+              <a:t>l</a:t>
+            </a:r>
+            <a:r>
+              <a:rPr lang="en-US" sz="2000" b="1" baseline="-25000" dirty="0">
+                <a:solidFill>
+                  <a:prstClr val="black"/>
+                </a:solidFill>
+                <a:latin typeface="Calibri" panose="020F0502020204030204"/>
+              </a:rPr>
+              <a:t>2</a:t>
+            </a:r>
+            <a:endParaRPr lang="en-IN" sz="1400" baseline="-25000" dirty="0"/>
+          </a:p>
+        </p:txBody>
+      </p:sp>
+      <p:cxnSp>
+        <p:nvCxnSpPr>
+          <p:cNvPr id="13" name="Straight Connector 12">
+            <a:extLst>
+              <a:ext uri="{FF2B5EF4-FFF2-40B4-BE49-F238E27FC236}">
+                <a16:creationId xmlns:a16="http://schemas.microsoft.com/office/drawing/2014/main" id="{472B5577-D041-42C4-B6C5-CA9A7A8E4E61}"/>
+              </a:ext>
+            </a:extLst>
+          </p:cNvPr>
+          <p:cNvCxnSpPr>
+            <a:cxnSpLocks/>
+            <a:stCxn id="7" idx="5"/>
+            <a:endCxn id="12" idx="0"/>
+          </p:cNvCxnSpPr>
+          <p:nvPr/>
+        </p:nvCxnSpPr>
+        <p:spPr>
+          <a:xfrm>
+            <a:off x="2126642" y="3680944"/>
+            <a:ext cx="447303" cy="642048"/>
+          </a:xfrm>
+          <a:prstGeom prst="line">
+            <a:avLst/>
+          </a:prstGeom>
+          <a:ln w="38100">
+            <a:solidFill>
+              <a:schemeClr val="bg2">
+                <a:lumMod val="90000"/>
+              </a:schemeClr>
+            </a:solidFill>
+          </a:ln>
+        </p:spPr>
+        <p:style>
+          <a:lnRef idx="1">
+            <a:schemeClr val="accent1"/>
+          </a:lnRef>
+          <a:fillRef idx="0">
+            <a:schemeClr val="accent1"/>
+          </a:fillRef>
+          <a:effectRef idx="0">
+            <a:schemeClr val="accent1"/>
+          </a:effectRef>
+          <a:fontRef idx="minor">
+            <a:schemeClr val="tx1"/>
+          </a:fontRef>
+        </p:style>
+      </p:cxnSp>
+      <p:cxnSp>
+        <p:nvCxnSpPr>
+          <p:cNvPr id="22" name="Straight Connector 21">
+            <a:extLst>
+              <a:ext uri="{FF2B5EF4-FFF2-40B4-BE49-F238E27FC236}">
+                <a16:creationId xmlns:a16="http://schemas.microsoft.com/office/drawing/2014/main" id="{6F00F4E0-5EA4-4367-A57B-717789CC8805}"/>
+              </a:ext>
+            </a:extLst>
+          </p:cNvPr>
+          <p:cNvCxnSpPr>
+            <a:cxnSpLocks/>
+            <a:stCxn id="5" idx="5"/>
+            <a:endCxn id="23" idx="0"/>
+          </p:cNvCxnSpPr>
+          <p:nvPr/>
+        </p:nvCxnSpPr>
+        <p:spPr>
+          <a:xfrm>
+            <a:off x="4964203" y="1699323"/>
+            <a:ext cx="1378557" cy="364668"/>
+          </a:xfrm>
+          <a:prstGeom prst="line">
+            <a:avLst/>
+          </a:prstGeom>
+          <a:ln w="38100">
+            <a:solidFill>
+              <a:schemeClr val="bg2">
+                <a:lumMod val="90000"/>
+              </a:schemeClr>
+            </a:solidFill>
+          </a:ln>
+        </p:spPr>
+        <p:style>
+          <a:lnRef idx="1">
+            <a:schemeClr val="accent1"/>
+          </a:lnRef>
+          <a:fillRef idx="0">
+            <a:schemeClr val="accent1"/>
+          </a:fillRef>
+          <a:effectRef idx="0">
+            <a:schemeClr val="accent1"/>
+          </a:effectRef>
+          <a:fontRef idx="minor">
+            <a:schemeClr val="tx1"/>
+          </a:fontRef>
+        </p:style>
+      </p:cxnSp>
+      <p:sp>
+        <p:nvSpPr>
+          <p:cNvPr id="23" name="Oval 22">
+            <a:extLst>
+              <a:ext uri="{FF2B5EF4-FFF2-40B4-BE49-F238E27FC236}">
+                <a16:creationId xmlns:a16="http://schemas.microsoft.com/office/drawing/2014/main" id="{97C7316D-B5DB-400A-B88F-F63FD56289C2}"/>
+              </a:ext>
+            </a:extLst>
+          </p:cNvPr>
+          <p:cNvSpPr>
+            <a:spLocks noChangeAspect="1"/>
+          </p:cNvSpPr>
+          <p:nvPr/>
+        </p:nvSpPr>
+        <p:spPr>
+          <a:xfrm>
+            <a:off x="6091185" y="2063991"/>
+            <a:ext cx="503150" cy="503150"/>
+          </a:xfrm>
+          <a:prstGeom prst="ellipse">
+            <a:avLst/>
+          </a:prstGeom>
+          <a:noFill/>
+          <a:ln w="38100">
+            <a:solidFill>
+              <a:schemeClr val="tx1"/>
+            </a:solidFill>
+          </a:ln>
+        </p:spPr>
+        <p:style>
+          <a:lnRef idx="2">
+            <a:schemeClr val="accent1">
+              <a:shade val="50000"/>
+            </a:schemeClr>
+          </a:lnRef>
+          <a:fillRef idx="1">
+            <a:schemeClr val="accent1"/>
+          </a:fillRef>
+          <a:effectRef idx="0">
+            <a:schemeClr val="accent1"/>
+          </a:effectRef>
+          <a:fontRef idx="minor">
+            <a:schemeClr val="lt1"/>
+          </a:fontRef>
+        </p:style>
+        <p:txBody>
+          <a:bodyPr rtlCol="0" anchor="ctr"/>
+          <a:lstStyle/>
+          <a:p>
+            <a:pPr algn="ctr"/>
+            <a:r>
+              <a:rPr lang="en-US" sz="2000" b="1" dirty="0">
+                <a:solidFill>
+                  <a:prstClr val="black"/>
+                </a:solidFill>
+                <a:latin typeface="Calibri" panose="020F0502020204030204"/>
+              </a:rPr>
+              <a:t>0</a:t>
+            </a:r>
+            <a:endParaRPr lang="en-IN" sz="2000" b="1" dirty="0">
+              <a:solidFill>
+                <a:prstClr val="black"/>
+              </a:solidFill>
+              <a:latin typeface="Calibri" panose="020F0502020204030204"/>
+            </a:endParaRPr>
+          </a:p>
+        </p:txBody>
+      </p:sp>
+      <p:sp>
+        <p:nvSpPr>
+          <p:cNvPr id="24" name="Oval 23">
+            <a:extLst>
+              <a:ext uri="{FF2B5EF4-FFF2-40B4-BE49-F238E27FC236}">
+                <a16:creationId xmlns:a16="http://schemas.microsoft.com/office/drawing/2014/main" id="{3EEC87DB-322F-4762-8F0A-78F2F089E578}"/>
+              </a:ext>
+            </a:extLst>
+          </p:cNvPr>
+          <p:cNvSpPr>
+            <a:spLocks noChangeAspect="1"/>
+          </p:cNvSpPr>
+          <p:nvPr/>
+        </p:nvSpPr>
+        <p:spPr>
+          <a:xfrm>
+            <a:off x="5135702" y="3251479"/>
+            <a:ext cx="503150" cy="503150"/>
+          </a:xfrm>
+          <a:prstGeom prst="ellipse">
+            <a:avLst/>
+          </a:prstGeom>
+          <a:noFill/>
+          <a:ln w="38100">
+            <a:solidFill>
+              <a:schemeClr val="tx1"/>
+            </a:solidFill>
+          </a:ln>
+        </p:spPr>
+        <p:style>
+          <a:lnRef idx="2">
+            <a:schemeClr val="accent1">
+              <a:shade val="50000"/>
+            </a:schemeClr>
+          </a:lnRef>
+          <a:fillRef idx="1">
+            <a:schemeClr val="accent1"/>
+          </a:fillRef>
+          <a:effectRef idx="0">
+            <a:schemeClr val="accent1"/>
+          </a:effectRef>
+          <a:fontRef idx="minor">
+            <a:schemeClr val="lt1"/>
+          </a:fontRef>
+        </p:style>
+        <p:txBody>
+          <a:bodyPr rtlCol="0" anchor="ctr"/>
+          <a:lstStyle/>
+          <a:p>
+            <a:pPr algn="ctr"/>
+            <a:r>
+              <a:rPr lang="en-US" sz="2000" b="1" dirty="0">
+                <a:solidFill>
+                  <a:prstClr val="black"/>
+                </a:solidFill>
+                <a:latin typeface="Calibri" panose="020F0502020204030204"/>
+              </a:rPr>
+              <a:t>1</a:t>
+            </a:r>
+            <a:endParaRPr lang="en-IN" sz="2000" b="1" dirty="0">
+              <a:solidFill>
+                <a:prstClr val="black"/>
+              </a:solidFill>
+              <a:latin typeface="Calibri" panose="020F0502020204030204"/>
+            </a:endParaRPr>
+          </a:p>
+        </p:txBody>
+      </p:sp>
+      <p:cxnSp>
+        <p:nvCxnSpPr>
+          <p:cNvPr id="25" name="Straight Connector 24">
+            <a:extLst>
+              <a:ext uri="{FF2B5EF4-FFF2-40B4-BE49-F238E27FC236}">
+                <a16:creationId xmlns:a16="http://schemas.microsoft.com/office/drawing/2014/main" id="{319F75DB-E2C5-4BEB-BB3E-19891C69C08F}"/>
+              </a:ext>
+            </a:extLst>
+          </p:cNvPr>
+          <p:cNvCxnSpPr>
+            <a:cxnSpLocks/>
+            <a:stCxn id="23" idx="3"/>
+            <a:endCxn id="24" idx="0"/>
+          </p:cNvCxnSpPr>
+          <p:nvPr/>
+        </p:nvCxnSpPr>
+        <p:spPr>
+          <a:xfrm flipH="1">
+            <a:off x="5387277" y="2493456"/>
+            <a:ext cx="777593" cy="758023"/>
+          </a:xfrm>
+          <a:prstGeom prst="line">
+            <a:avLst/>
+          </a:prstGeom>
+          <a:ln w="38100">
+            <a:solidFill>
+              <a:schemeClr val="bg2">
+                <a:lumMod val="90000"/>
+              </a:schemeClr>
+            </a:solidFill>
+          </a:ln>
+        </p:spPr>
+        <p:style>
+          <a:lnRef idx="1">
+            <a:schemeClr val="accent1"/>
+          </a:lnRef>
+          <a:fillRef idx="0">
+            <a:schemeClr val="accent1"/>
+          </a:fillRef>
+          <a:effectRef idx="0">
+            <a:schemeClr val="accent1"/>
+          </a:effectRef>
+          <a:fontRef idx="minor">
+            <a:schemeClr val="tx1"/>
+          </a:fontRef>
+        </p:style>
+      </p:cxnSp>
+      <p:cxnSp>
+        <p:nvCxnSpPr>
+          <p:cNvPr id="27" name="Straight Connector 26">
+            <a:extLst>
+              <a:ext uri="{FF2B5EF4-FFF2-40B4-BE49-F238E27FC236}">
+                <a16:creationId xmlns:a16="http://schemas.microsoft.com/office/drawing/2014/main" id="{D4823082-10E5-4063-8D02-FB0EBCD35DBD}"/>
+              </a:ext>
+            </a:extLst>
+          </p:cNvPr>
+          <p:cNvCxnSpPr>
+            <a:cxnSpLocks/>
+            <a:stCxn id="23" idx="5"/>
+            <a:endCxn id="26" idx="0"/>
+          </p:cNvCxnSpPr>
+          <p:nvPr/>
+        </p:nvCxnSpPr>
+        <p:spPr>
+          <a:xfrm>
+            <a:off x="6520650" y="2493456"/>
+            <a:ext cx="936535" cy="753944"/>
+          </a:xfrm>
+          <a:prstGeom prst="line">
+            <a:avLst/>
+          </a:prstGeom>
+          <a:ln w="38100">
+            <a:solidFill>
+              <a:schemeClr val="bg2">
+                <a:lumMod val="90000"/>
+              </a:schemeClr>
+            </a:solidFill>
+          </a:ln>
+        </p:spPr>
+        <p:style>
+          <a:lnRef idx="1">
+            <a:schemeClr val="accent1"/>
+          </a:lnRef>
+          <a:fillRef idx="0">
+            <a:schemeClr val="accent1"/>
+          </a:fillRef>
+          <a:effectRef idx="0">
+            <a:schemeClr val="accent1"/>
+          </a:effectRef>
+          <a:fontRef idx="minor">
+            <a:schemeClr val="tx1"/>
+          </a:fontRef>
+        </p:style>
+      </p:cxnSp>
+      <p:sp>
+        <p:nvSpPr>
+          <p:cNvPr id="33" name="Oval 32">
+            <a:extLst>
+              <a:ext uri="{FF2B5EF4-FFF2-40B4-BE49-F238E27FC236}">
+                <a16:creationId xmlns:a16="http://schemas.microsoft.com/office/drawing/2014/main" id="{B35F63D9-DB4B-4D10-871A-1A1EF72033AA}"/>
+              </a:ext>
+            </a:extLst>
+          </p:cNvPr>
+          <p:cNvSpPr>
+            <a:spLocks noChangeAspect="1"/>
+          </p:cNvSpPr>
+          <p:nvPr/>
+        </p:nvSpPr>
+        <p:spPr>
+          <a:xfrm>
+            <a:off x="4424624" y="4322992"/>
+            <a:ext cx="503150" cy="503150"/>
+          </a:xfrm>
+          <a:prstGeom prst="ellipse">
+            <a:avLst/>
+          </a:prstGeom>
+          <a:noFill/>
+          <a:ln w="38100">
+            <a:solidFill>
+              <a:schemeClr val="tx1"/>
+            </a:solidFill>
+          </a:ln>
+        </p:spPr>
+        <p:style>
+          <a:lnRef idx="2">
+            <a:schemeClr val="accent1">
+              <a:shade val="50000"/>
+            </a:schemeClr>
+          </a:lnRef>
+          <a:fillRef idx="1">
+            <a:schemeClr val="accent1"/>
+          </a:fillRef>
+          <a:effectRef idx="0">
+            <a:schemeClr val="accent1"/>
+          </a:effectRef>
+          <a:fontRef idx="minor">
+            <a:schemeClr val="lt1"/>
+          </a:fontRef>
+        </p:style>
+        <p:txBody>
+          <a:bodyPr rtlCol="0" anchor="ctr"/>
+          <a:lstStyle/>
+          <a:p>
+            <a:pPr algn="ctr"/>
+            <a:r>
+              <a:rPr lang="en-US" sz="2000" b="1" dirty="0">
+                <a:solidFill>
+                  <a:prstClr val="black"/>
+                </a:solidFill>
+                <a:latin typeface="Calibri" panose="020F0502020204030204"/>
+              </a:rPr>
+              <a:t>l</a:t>
+            </a:r>
+            <a:r>
+              <a:rPr lang="en-US" sz="2000" b="1" baseline="-25000" dirty="0">
+                <a:solidFill>
+                  <a:prstClr val="black"/>
+                </a:solidFill>
+                <a:latin typeface="Calibri" panose="020F0502020204030204"/>
+              </a:rPr>
+              <a:t>4</a:t>
+            </a:r>
+            <a:endParaRPr lang="en-IN" sz="1400" baseline="-25000" dirty="0"/>
+          </a:p>
+        </p:txBody>
+      </p:sp>
+      <p:cxnSp>
+        <p:nvCxnSpPr>
+          <p:cNvPr id="34" name="Straight Connector 33">
+            <a:extLst>
+              <a:ext uri="{FF2B5EF4-FFF2-40B4-BE49-F238E27FC236}">
+                <a16:creationId xmlns:a16="http://schemas.microsoft.com/office/drawing/2014/main" id="{1E00399F-F557-481C-B7AB-EE04A35753BB}"/>
+              </a:ext>
+            </a:extLst>
+          </p:cNvPr>
+          <p:cNvCxnSpPr>
+            <a:cxnSpLocks/>
+            <a:stCxn id="24" idx="3"/>
+            <a:endCxn id="33" idx="0"/>
+          </p:cNvCxnSpPr>
+          <p:nvPr/>
+        </p:nvCxnSpPr>
+        <p:spPr>
+          <a:xfrm flipH="1">
+            <a:off x="4676199" y="3680944"/>
+            <a:ext cx="533188" cy="642048"/>
+          </a:xfrm>
+          <a:prstGeom prst="line">
+            <a:avLst/>
+          </a:prstGeom>
+          <a:ln w="38100">
+            <a:solidFill>
+              <a:schemeClr val="bg2">
+                <a:lumMod val="90000"/>
+              </a:schemeClr>
+            </a:solidFill>
+          </a:ln>
+        </p:spPr>
+        <p:style>
+          <a:lnRef idx="1">
+            <a:schemeClr val="accent1"/>
+          </a:lnRef>
+          <a:fillRef idx="0">
+            <a:schemeClr val="accent1"/>
+          </a:fillRef>
+          <a:effectRef idx="0">
+            <a:schemeClr val="accent1"/>
+          </a:effectRef>
+          <a:fontRef idx="minor">
+            <a:schemeClr val="tx1"/>
+          </a:fontRef>
+        </p:style>
+      </p:cxnSp>
+      <p:sp>
+        <p:nvSpPr>
+          <p:cNvPr id="35" name="Oval 34">
+            <a:extLst>
+              <a:ext uri="{FF2B5EF4-FFF2-40B4-BE49-F238E27FC236}">
+                <a16:creationId xmlns:a16="http://schemas.microsoft.com/office/drawing/2014/main" id="{634B2D6B-9E86-4541-8140-4B9FB4A9F7DD}"/>
+              </a:ext>
+            </a:extLst>
+          </p:cNvPr>
+          <p:cNvSpPr>
+            <a:spLocks noChangeAspect="1"/>
+          </p:cNvSpPr>
+          <p:nvPr/>
+        </p:nvSpPr>
+        <p:spPr>
+          <a:xfrm>
+            <a:off x="5789470" y="4322992"/>
+            <a:ext cx="503150" cy="503150"/>
+          </a:xfrm>
+          <a:prstGeom prst="ellipse">
+            <a:avLst/>
+          </a:prstGeom>
+          <a:noFill/>
+          <a:ln w="38100">
+            <a:solidFill>
+              <a:schemeClr val="tx1"/>
+            </a:solidFill>
+          </a:ln>
+        </p:spPr>
+        <p:style>
+          <a:lnRef idx="2">
+            <a:schemeClr val="accent1">
+              <a:shade val="50000"/>
+            </a:schemeClr>
+          </a:lnRef>
+          <a:fillRef idx="1">
+            <a:schemeClr val="accent1"/>
+          </a:fillRef>
+          <a:effectRef idx="0">
+            <a:schemeClr val="accent1"/>
+          </a:effectRef>
+          <a:fontRef idx="minor">
+            <a:schemeClr val="lt1"/>
+          </a:fontRef>
+        </p:style>
+        <p:txBody>
+          <a:bodyPr rtlCol="0" anchor="ctr"/>
+          <a:lstStyle/>
+          <a:p>
+            <a:pPr algn="ctr"/>
+            <a:r>
+              <a:rPr lang="en-US" sz="2000" b="1" dirty="0">
+                <a:solidFill>
+                  <a:prstClr val="black"/>
+                </a:solidFill>
+                <a:latin typeface="Calibri" panose="020F0502020204030204"/>
+              </a:rPr>
+              <a:t>l</a:t>
+            </a:r>
+            <a:r>
+              <a:rPr lang="en-US" sz="2000" b="1" baseline="-25000" dirty="0">
+                <a:solidFill>
+                  <a:prstClr val="black"/>
+                </a:solidFill>
+                <a:latin typeface="Calibri" panose="020F0502020204030204"/>
+              </a:rPr>
+              <a:t>5</a:t>
+            </a:r>
+            <a:endParaRPr lang="en-IN" sz="1400" baseline="-25000" dirty="0"/>
+          </a:p>
+        </p:txBody>
+      </p:sp>
+      <p:cxnSp>
+        <p:nvCxnSpPr>
+          <p:cNvPr id="36" name="Straight Connector 35">
+            <a:extLst>
+              <a:ext uri="{FF2B5EF4-FFF2-40B4-BE49-F238E27FC236}">
+                <a16:creationId xmlns:a16="http://schemas.microsoft.com/office/drawing/2014/main" id="{C2A8E1C3-B711-4828-BB5F-63B841A050D6}"/>
+              </a:ext>
+            </a:extLst>
+          </p:cNvPr>
+          <p:cNvCxnSpPr>
+            <a:cxnSpLocks/>
+            <a:stCxn id="24" idx="5"/>
+            <a:endCxn id="35" idx="0"/>
+          </p:cNvCxnSpPr>
+          <p:nvPr/>
+        </p:nvCxnSpPr>
+        <p:spPr>
+          <a:xfrm>
+            <a:off x="5565167" y="3680944"/>
+            <a:ext cx="475878" cy="642048"/>
+          </a:xfrm>
+          <a:prstGeom prst="line">
+            <a:avLst/>
+          </a:prstGeom>
+          <a:ln w="38100">
+            <a:solidFill>
+              <a:schemeClr val="bg2">
+                <a:lumMod val="90000"/>
+              </a:schemeClr>
+            </a:solidFill>
+          </a:ln>
+        </p:spPr>
+        <p:style>
+          <a:lnRef idx="1">
+            <a:schemeClr val="accent1"/>
+          </a:lnRef>
+          <a:fillRef idx="0">
+            <a:schemeClr val="accent1"/>
+          </a:fillRef>
+          <a:effectRef idx="0">
+            <a:schemeClr val="accent1"/>
+          </a:effectRef>
+          <a:fontRef idx="minor">
+            <a:schemeClr val="tx1"/>
+          </a:fontRef>
+        </p:style>
+      </p:cxnSp>
+      <p:sp>
+        <p:nvSpPr>
+          <p:cNvPr id="39" name="Oval 38">
+            <a:extLst>
+              <a:ext uri="{FF2B5EF4-FFF2-40B4-BE49-F238E27FC236}">
+                <a16:creationId xmlns:a16="http://schemas.microsoft.com/office/drawing/2014/main" id="{06AAD07B-4702-4E18-8F5E-3DD3B789B64D}"/>
+              </a:ext>
+            </a:extLst>
+          </p:cNvPr>
+          <p:cNvSpPr>
+            <a:spLocks noChangeAspect="1"/>
+          </p:cNvSpPr>
+          <p:nvPr/>
+        </p:nvSpPr>
+        <p:spPr>
+          <a:xfrm>
+            <a:off x="6501074" y="4322992"/>
+            <a:ext cx="503150" cy="503150"/>
+          </a:xfrm>
+          <a:prstGeom prst="ellipse">
+            <a:avLst/>
+          </a:prstGeom>
+          <a:noFill/>
+          <a:ln w="38100">
+            <a:solidFill>
+              <a:schemeClr val="tx1"/>
+            </a:solidFill>
+          </a:ln>
+        </p:spPr>
+        <p:style>
+          <a:lnRef idx="2">
+            <a:schemeClr val="accent1">
+              <a:shade val="50000"/>
+            </a:schemeClr>
+          </a:lnRef>
+          <a:fillRef idx="1">
+            <a:schemeClr val="accent1"/>
+          </a:fillRef>
+          <a:effectRef idx="0">
+            <a:schemeClr val="accent1"/>
+          </a:effectRef>
+          <a:fontRef idx="minor">
+            <a:schemeClr val="lt1"/>
+          </a:fontRef>
+        </p:style>
+        <p:txBody>
+          <a:bodyPr rtlCol="0" anchor="ctr"/>
+          <a:lstStyle/>
+          <a:p>
+            <a:pPr algn="ctr"/>
+            <a:r>
+              <a:rPr lang="en-US" sz="2000" b="1" dirty="0">
+                <a:solidFill>
+                  <a:prstClr val="black"/>
+                </a:solidFill>
+                <a:latin typeface="Calibri" panose="020F0502020204030204"/>
+              </a:rPr>
+              <a:t>l</a:t>
+            </a:r>
+            <a:r>
+              <a:rPr lang="en-US" sz="2000" b="1" baseline="-25000" dirty="0">
+                <a:solidFill>
+                  <a:prstClr val="black"/>
+                </a:solidFill>
+                <a:latin typeface="Calibri" panose="020F0502020204030204"/>
+              </a:rPr>
+              <a:t>6</a:t>
+            </a:r>
+            <a:endParaRPr lang="en-IN" sz="1400" baseline="-25000" dirty="0"/>
+          </a:p>
+        </p:txBody>
+      </p:sp>
+      <p:cxnSp>
+        <p:nvCxnSpPr>
+          <p:cNvPr id="40" name="Straight Connector 39">
+            <a:extLst>
+              <a:ext uri="{FF2B5EF4-FFF2-40B4-BE49-F238E27FC236}">
+                <a16:creationId xmlns:a16="http://schemas.microsoft.com/office/drawing/2014/main" id="{F3AB8360-D6E0-45F7-AEED-5A7540429710}"/>
+              </a:ext>
+            </a:extLst>
+          </p:cNvPr>
+          <p:cNvCxnSpPr>
+            <a:cxnSpLocks/>
+            <a:endCxn id="39" idx="0"/>
+          </p:cNvCxnSpPr>
+          <p:nvPr/>
+        </p:nvCxnSpPr>
+        <p:spPr>
+          <a:xfrm flipH="1">
+            <a:off x="6752649" y="3453092"/>
+            <a:ext cx="637393" cy="869900"/>
+          </a:xfrm>
+          <a:prstGeom prst="line">
+            <a:avLst/>
+          </a:prstGeom>
+          <a:ln w="38100">
+            <a:solidFill>
+              <a:schemeClr val="bg2">
+                <a:lumMod val="90000"/>
+              </a:schemeClr>
+            </a:solidFill>
+          </a:ln>
+        </p:spPr>
+        <p:style>
+          <a:lnRef idx="1">
+            <a:schemeClr val="accent1"/>
+          </a:lnRef>
+          <a:fillRef idx="0">
+            <a:schemeClr val="accent1"/>
+          </a:fillRef>
+          <a:effectRef idx="0">
+            <a:schemeClr val="accent1"/>
+          </a:effectRef>
+          <a:fontRef idx="minor">
+            <a:schemeClr val="tx1"/>
+          </a:fontRef>
+        </p:style>
+      </p:cxnSp>
+      <p:sp>
+        <p:nvSpPr>
+          <p:cNvPr id="41" name="Oval 40">
+            <a:extLst>
+              <a:ext uri="{FF2B5EF4-FFF2-40B4-BE49-F238E27FC236}">
+                <a16:creationId xmlns:a16="http://schemas.microsoft.com/office/drawing/2014/main" id="{E16550BF-4E2C-4633-B77A-BE0875108AAE}"/>
+              </a:ext>
+            </a:extLst>
+          </p:cNvPr>
+          <p:cNvSpPr>
+            <a:spLocks noChangeAspect="1"/>
+          </p:cNvSpPr>
+          <p:nvPr/>
+        </p:nvSpPr>
+        <p:spPr>
+          <a:xfrm>
+            <a:off x="7865920" y="4322992"/>
+            <a:ext cx="503150" cy="503150"/>
+          </a:xfrm>
+          <a:prstGeom prst="ellipse">
+            <a:avLst/>
+          </a:prstGeom>
+          <a:noFill/>
+          <a:ln w="38100">
+            <a:solidFill>
+              <a:schemeClr val="tx1"/>
+            </a:solidFill>
+          </a:ln>
+        </p:spPr>
+        <p:style>
+          <a:lnRef idx="2">
+            <a:schemeClr val="accent1">
+              <a:shade val="50000"/>
+            </a:schemeClr>
+          </a:lnRef>
+          <a:fillRef idx="1">
+            <a:schemeClr val="accent1"/>
+          </a:fillRef>
+          <a:effectRef idx="0">
+            <a:schemeClr val="accent1"/>
+          </a:effectRef>
+          <a:fontRef idx="minor">
+            <a:schemeClr val="lt1"/>
+          </a:fontRef>
+        </p:style>
+        <p:txBody>
+          <a:bodyPr rtlCol="0" anchor="ctr"/>
+          <a:lstStyle/>
+          <a:p>
+            <a:pPr algn="ctr"/>
+            <a:r>
+              <a:rPr lang="en-US" sz="2000" b="1" dirty="0">
+                <a:solidFill>
+                  <a:prstClr val="black"/>
+                </a:solidFill>
+                <a:latin typeface="Calibri" panose="020F0502020204030204"/>
+              </a:rPr>
+              <a:t>l</a:t>
+            </a:r>
+            <a:r>
+              <a:rPr lang="en-US" sz="2000" b="1" baseline="-25000" dirty="0">
+                <a:solidFill>
+                  <a:prstClr val="black"/>
+                </a:solidFill>
+                <a:latin typeface="Calibri" panose="020F0502020204030204"/>
+              </a:rPr>
+              <a:t>7</a:t>
+            </a:r>
+            <a:endParaRPr lang="en-IN" sz="1400" baseline="-25000" dirty="0"/>
+          </a:p>
+        </p:txBody>
+      </p:sp>
+      <p:cxnSp>
+        <p:nvCxnSpPr>
+          <p:cNvPr id="42" name="Straight Connector 41">
+            <a:extLst>
+              <a:ext uri="{FF2B5EF4-FFF2-40B4-BE49-F238E27FC236}">
+                <a16:creationId xmlns:a16="http://schemas.microsoft.com/office/drawing/2014/main" id="{0A18AB53-D305-472E-86CB-94FB9BF06F96}"/>
+              </a:ext>
+            </a:extLst>
+          </p:cNvPr>
+          <p:cNvCxnSpPr>
+            <a:cxnSpLocks/>
+            <a:endCxn id="41" idx="0"/>
+          </p:cNvCxnSpPr>
+          <p:nvPr/>
+        </p:nvCxnSpPr>
+        <p:spPr>
+          <a:xfrm>
+            <a:off x="7515083" y="3508927"/>
+            <a:ext cx="602412" cy="814065"/>
+          </a:xfrm>
+          <a:prstGeom prst="line">
+            <a:avLst/>
+          </a:prstGeom>
+          <a:ln w="38100">
+            <a:solidFill>
+              <a:schemeClr val="bg2">
+                <a:lumMod val="90000"/>
+              </a:schemeClr>
+            </a:solidFill>
+          </a:ln>
+        </p:spPr>
+        <p:style>
+          <a:lnRef idx="1">
+            <a:schemeClr val="accent1"/>
+          </a:lnRef>
+          <a:fillRef idx="0">
+            <a:schemeClr val="accent1"/>
+          </a:fillRef>
+          <a:effectRef idx="0">
+            <a:schemeClr val="accent1"/>
+          </a:effectRef>
+          <a:fontRef idx="minor">
+            <a:schemeClr val="tx1"/>
+          </a:fontRef>
+        </p:style>
+      </p:cxnSp>
+      <p:sp>
+        <p:nvSpPr>
+          <p:cNvPr id="44" name="TextBox 43">
+            <a:extLst>
+              <a:ext uri="{FF2B5EF4-FFF2-40B4-BE49-F238E27FC236}">
+                <a16:creationId xmlns:a16="http://schemas.microsoft.com/office/drawing/2014/main" id="{E95D731A-343F-4558-9CF5-AA3CC006C3D3}"/>
+              </a:ext>
+            </a:extLst>
+          </p:cNvPr>
+          <p:cNvSpPr txBox="1"/>
+          <p:nvPr/>
+        </p:nvSpPr>
+        <p:spPr>
+          <a:xfrm>
+            <a:off x="2362529" y="1372916"/>
+            <a:ext cx="534988" cy="523220"/>
+          </a:xfrm>
+          <a:prstGeom prst="rect">
+            <a:avLst/>
+          </a:prstGeom>
+          <a:noFill/>
+        </p:spPr>
+        <p:txBody>
+          <a:bodyPr wrap="square" rtlCol="0">
+            <a:spAutoFit/>
+          </a:bodyPr>
+          <a:lstStyle/>
+          <a:p>
+            <a:r>
+              <a:rPr lang="en-US" sz="2800" b="1" dirty="0">
+                <a:solidFill>
+                  <a:schemeClr val="accent6">
+                    <a:lumMod val="60000"/>
+                    <a:lumOff val="40000"/>
+                  </a:schemeClr>
+                </a:solidFill>
+              </a:rPr>
+              <a:t>T</a:t>
+            </a:r>
+            <a:r>
+              <a:rPr lang="en-US" sz="2800" b="1" baseline="-25000" dirty="0">
+                <a:solidFill>
+                  <a:schemeClr val="accent6">
+                    <a:lumMod val="60000"/>
+                    <a:lumOff val="40000"/>
+                  </a:schemeClr>
+                </a:solidFill>
+              </a:rPr>
+              <a:t>1</a:t>
+            </a:r>
+            <a:endParaRPr lang="en-IN" sz="2800" b="1" baseline="-25000" dirty="0">
               <a:solidFill>
                 <a:schemeClr val="accent6">
                   <a:lumMod val="60000"/>
                   <a:lumOff val="40000"/>
                 </a:schemeClr>
               </a:solidFill>
-            </a:ln>
-          </p:spPr>
-          <p:style>
-            <a:lnRef idx="2">
-              <a:schemeClr val="accent1">
-                <a:shade val="50000"/>
-              </a:schemeClr>
-            </a:lnRef>
-            <a:fillRef idx="1">
-              <a:schemeClr val="accent1"/>
-            </a:fillRef>
-            <a:effectRef idx="0">
-              <a:schemeClr val="accent1"/>
-            </a:effectRef>
-            <a:fontRef idx="minor">
-              <a:schemeClr val="lt1"/>
-            </a:fontRef>
-          </p:style>
-          <p:txBody>
-            <a:bodyPr rtlCol="0" anchor="ctr"/>
-            <a:lstStyle/>
-            <a:p>
-              <a:pPr algn="ctr"/>
-              <a:endParaRPr lang="en-IN"/>
-            </a:p>
-          </p:txBody>
-        </p:sp>
-        <p:grpSp>
-          <p:nvGrpSpPr>
-            <p:cNvPr id="46" name="Group 45">
-              <a:extLst>
-                <a:ext uri="{FF2B5EF4-FFF2-40B4-BE49-F238E27FC236}">
-                  <a16:creationId xmlns:a16="http://schemas.microsoft.com/office/drawing/2014/main" id="{2C88D64D-2A35-40C0-B5A0-69D76023760E}"/>
-                </a:ext>
-              </a:extLst>
-            </p:cNvPr>
-            <p:cNvGrpSpPr/>
-            <p:nvPr/>
-          </p:nvGrpSpPr>
-          <p:grpSpPr>
-            <a:xfrm>
-              <a:off x="671774" y="654188"/>
-              <a:ext cx="7402021" cy="4318284"/>
-              <a:chOff x="671774" y="654188"/>
-              <a:chExt cx="7402021" cy="4318284"/>
-            </a:xfrm>
-          </p:grpSpPr>
-          <p:sp>
-            <p:nvSpPr>
-              <p:cNvPr id="43" name="Isosceles Triangle 42">
-                <a:extLst>
-                  <a:ext uri="{FF2B5EF4-FFF2-40B4-BE49-F238E27FC236}">
-                    <a16:creationId xmlns:a16="http://schemas.microsoft.com/office/drawing/2014/main" id="{F2E86EA5-8F04-456A-A7C3-0FF608424FDD}"/>
-                  </a:ext>
-                </a:extLst>
-              </p:cNvPr>
-              <p:cNvSpPr/>
-              <p:nvPr/>
-            </p:nvSpPr>
-            <p:spPr>
-              <a:xfrm>
-                <a:off x="4234649" y="1431813"/>
-                <a:ext cx="3722702" cy="2279876"/>
-              </a:xfrm>
-              <a:prstGeom prst="triangle">
-                <a:avLst/>
-              </a:prstGeom>
-              <a:noFill/>
-              <a:ln w="73025">
+            </a:endParaRPr>
+          </a:p>
+        </p:txBody>
+      </p:sp>
+      <p:sp>
+        <p:nvSpPr>
+          <p:cNvPr id="45" name="TextBox 44">
+            <a:extLst>
+              <a:ext uri="{FF2B5EF4-FFF2-40B4-BE49-F238E27FC236}">
+                <a16:creationId xmlns:a16="http://schemas.microsoft.com/office/drawing/2014/main" id="{2D38512E-8398-4CD2-9794-C3C09D4C2857}"/>
+              </a:ext>
+            </a:extLst>
+          </p:cNvPr>
+          <p:cNvSpPr txBox="1"/>
+          <p:nvPr/>
+        </p:nvSpPr>
+        <p:spPr>
+          <a:xfrm>
+            <a:off x="7019243" y="1914672"/>
+            <a:ext cx="534988" cy="523220"/>
+          </a:xfrm>
+          <a:prstGeom prst="rect">
+            <a:avLst/>
+          </a:prstGeom>
+          <a:noFill/>
+        </p:spPr>
+        <p:txBody>
+          <a:bodyPr wrap="square" rtlCol="0">
+            <a:spAutoFit/>
+          </a:bodyPr>
+          <a:lstStyle/>
+          <a:p>
+            <a:r>
+              <a:rPr lang="en-US" sz="2800" b="1" dirty="0">
                 <a:solidFill>
                   <a:schemeClr val="accent5">
                     <a:lumMod val="60000"/>
                     <a:lumOff val="40000"/>
                   </a:schemeClr>
                 </a:solidFill>
-              </a:ln>
-            </p:spPr>
-            <p:style>
-              <a:lnRef idx="2">
-                <a:schemeClr val="accent1">
-                  <a:shade val="50000"/>
-                </a:schemeClr>
-              </a:lnRef>
-              <a:fillRef idx="1">
-                <a:schemeClr val="accent1"/>
-              </a:fillRef>
-              <a:effectRef idx="0">
-                <a:schemeClr val="accent1"/>
-              </a:effectRef>
-              <a:fontRef idx="minor">
-                <a:schemeClr val="lt1"/>
-              </a:fontRef>
-            </p:style>
-            <p:txBody>
-              <a:bodyPr rtlCol="0" anchor="ctr"/>
-              <a:lstStyle/>
-              <a:p>
-                <a:pPr algn="ctr"/>
-                <a:endParaRPr lang="en-IN"/>
-              </a:p>
-            </p:txBody>
-          </p:sp>
-          <p:sp>
-            <p:nvSpPr>
-              <p:cNvPr id="5" name="Oval 4">
-                <a:extLst>
-                  <a:ext uri="{FF2B5EF4-FFF2-40B4-BE49-F238E27FC236}">
-                    <a16:creationId xmlns:a16="http://schemas.microsoft.com/office/drawing/2014/main" id="{6950DDE1-1936-44E0-B70A-3F44CC03482E}"/>
-                  </a:ext>
-                </a:extLst>
-              </p:cNvPr>
-              <p:cNvSpPr>
-                <a:spLocks noChangeAspect="1"/>
-              </p:cNvSpPr>
-              <p:nvPr/>
-            </p:nvSpPr>
-            <p:spPr>
-              <a:xfrm>
-                <a:off x="4239463" y="654188"/>
-                <a:ext cx="503150" cy="503150"/>
-              </a:xfrm>
-              <a:prstGeom prst="ellipse">
-                <a:avLst/>
-              </a:prstGeom>
-              <a:noFill/>
-              <a:ln w="38100">
+              </a:rPr>
+              <a:t>T</a:t>
+            </a:r>
+            <a:r>
+              <a:rPr lang="en-US" sz="2800" b="1" baseline="-25000" dirty="0">
                 <a:solidFill>
-                  <a:schemeClr val="tx1"/>
-                </a:solidFill>
-              </a:ln>
-            </p:spPr>
-            <p:style>
-              <a:lnRef idx="2">
-                <a:schemeClr val="accent1">
-                  <a:shade val="50000"/>
-                </a:schemeClr>
-              </a:lnRef>
-              <a:fillRef idx="1">
-                <a:schemeClr val="accent1"/>
-              </a:fillRef>
-              <a:effectRef idx="0">
-                <a:schemeClr val="accent1"/>
-              </a:effectRef>
-              <a:fontRef idx="minor">
-                <a:schemeClr val="lt1"/>
-              </a:fontRef>
-            </p:style>
-            <p:txBody>
-              <a:bodyPr rtlCol="0" anchor="ctr"/>
-              <a:lstStyle/>
-              <a:p>
-                <a:pPr algn="ctr"/>
-                <a:r>
-                  <a:rPr lang="en-US" sz="2000" b="1" dirty="0">
-                    <a:solidFill>
-                      <a:prstClr val="black"/>
-                    </a:solidFill>
-                    <a:latin typeface="Calibri" panose="020F0502020204030204"/>
-                  </a:rPr>
-                  <a:t>0</a:t>
-                </a:r>
-                <a:endParaRPr lang="en-IN" sz="2000" b="1" dirty="0">
-                  <a:solidFill>
-                    <a:prstClr val="black"/>
-                  </a:solidFill>
-                  <a:latin typeface="Calibri" panose="020F0502020204030204"/>
-                </a:endParaRPr>
-              </a:p>
-            </p:txBody>
-          </p:sp>
-          <p:sp>
-            <p:nvSpPr>
-              <p:cNvPr id="6" name="Oval 5">
-                <a:extLst>
-                  <a:ext uri="{FF2B5EF4-FFF2-40B4-BE49-F238E27FC236}">
-                    <a16:creationId xmlns:a16="http://schemas.microsoft.com/office/drawing/2014/main" id="{2D1C4D35-DB8A-4E83-9F27-D6C971F6F941}"/>
-                  </a:ext>
-                </a:extLst>
-              </p:cNvPr>
-              <p:cNvSpPr>
-                <a:spLocks noChangeAspect="1"/>
-              </p:cNvSpPr>
-              <p:nvPr/>
-            </p:nvSpPr>
-            <p:spPr>
-              <a:xfrm>
-                <a:off x="2376435" y="1867421"/>
-                <a:ext cx="503150" cy="503150"/>
-              </a:xfrm>
-              <a:prstGeom prst="ellipse">
-                <a:avLst/>
-              </a:prstGeom>
-              <a:noFill/>
-              <a:ln w="38100">
-                <a:solidFill>
-                  <a:schemeClr val="tx1"/>
-                </a:solidFill>
-              </a:ln>
-            </p:spPr>
-            <p:style>
-              <a:lnRef idx="2">
-                <a:schemeClr val="accent1">
-                  <a:shade val="50000"/>
-                </a:schemeClr>
-              </a:lnRef>
-              <a:fillRef idx="1">
-                <a:schemeClr val="accent1"/>
-              </a:fillRef>
-              <a:effectRef idx="0">
-                <a:schemeClr val="accent1"/>
-              </a:effectRef>
-              <a:fontRef idx="minor">
-                <a:schemeClr val="lt1"/>
-              </a:fontRef>
-            </p:style>
-            <p:txBody>
-              <a:bodyPr rtlCol="0" anchor="ctr"/>
-              <a:lstStyle/>
-              <a:p>
-                <a:pPr algn="ctr"/>
-                <a:r>
-                  <a:rPr lang="en-US" sz="2000" b="1" dirty="0">
-                    <a:solidFill>
-                      <a:prstClr val="black"/>
-                    </a:solidFill>
-                    <a:latin typeface="Calibri" panose="020F0502020204030204"/>
-                  </a:rPr>
-                  <a:t>1</a:t>
-                </a:r>
-                <a:endParaRPr lang="en-IN" sz="2000" b="1" dirty="0">
-                  <a:solidFill>
-                    <a:prstClr val="black"/>
-                  </a:solidFill>
-                  <a:latin typeface="Calibri" panose="020F0502020204030204"/>
-                </a:endParaRPr>
-              </a:p>
-            </p:txBody>
-          </p:sp>
-          <p:sp>
-            <p:nvSpPr>
-              <p:cNvPr id="7" name="Oval 6">
-                <a:extLst>
-                  <a:ext uri="{FF2B5EF4-FFF2-40B4-BE49-F238E27FC236}">
-                    <a16:creationId xmlns:a16="http://schemas.microsoft.com/office/drawing/2014/main" id="{70593105-077C-4CD5-936C-20031FE25E42}"/>
-                  </a:ext>
-                </a:extLst>
-              </p:cNvPr>
-              <p:cNvSpPr>
-                <a:spLocks noChangeAspect="1"/>
-              </p:cNvSpPr>
-              <p:nvPr/>
-            </p:nvSpPr>
-            <p:spPr>
-              <a:xfrm>
-                <a:off x="1401902" y="3054909"/>
-                <a:ext cx="503150" cy="503150"/>
-              </a:xfrm>
-              <a:prstGeom prst="ellipse">
-                <a:avLst/>
-              </a:prstGeom>
-              <a:noFill/>
-              <a:ln w="38100">
-                <a:solidFill>
-                  <a:schemeClr val="tx1"/>
-                </a:solidFill>
-              </a:ln>
-            </p:spPr>
-            <p:style>
-              <a:lnRef idx="2">
-                <a:schemeClr val="accent1">
-                  <a:shade val="50000"/>
-                </a:schemeClr>
-              </a:lnRef>
-              <a:fillRef idx="1">
-                <a:schemeClr val="accent1"/>
-              </a:fillRef>
-              <a:effectRef idx="0">
-                <a:schemeClr val="accent1"/>
-              </a:effectRef>
-              <a:fontRef idx="minor">
-                <a:schemeClr val="lt1"/>
-              </a:fontRef>
-            </p:style>
-            <p:txBody>
-              <a:bodyPr rtlCol="0" anchor="ctr"/>
-              <a:lstStyle/>
-              <a:p>
-                <a:pPr algn="ctr"/>
-                <a:r>
-                  <a:rPr lang="en-US" sz="2000" b="1" dirty="0">
-                    <a:solidFill>
-                      <a:prstClr val="black"/>
-                    </a:solidFill>
-                    <a:latin typeface="Calibri" panose="020F0502020204030204"/>
-                  </a:rPr>
-                  <a:t>2</a:t>
-                </a:r>
-                <a:endParaRPr lang="en-IN" sz="2000" b="1" dirty="0">
-                  <a:solidFill>
-                    <a:prstClr val="black"/>
-                  </a:solidFill>
-                  <a:latin typeface="Calibri" panose="020F0502020204030204"/>
-                </a:endParaRPr>
-              </a:p>
-            </p:txBody>
-          </p:sp>
-          <p:cxnSp>
-            <p:nvCxnSpPr>
-              <p:cNvPr id="8" name="Straight Connector 7">
-                <a:extLst>
-                  <a:ext uri="{FF2B5EF4-FFF2-40B4-BE49-F238E27FC236}">
-                    <a16:creationId xmlns:a16="http://schemas.microsoft.com/office/drawing/2014/main" id="{11B69B95-DD16-42A8-8719-43DFCFA18D09}"/>
-                  </a:ext>
-                </a:extLst>
-              </p:cNvPr>
-              <p:cNvCxnSpPr>
-                <a:cxnSpLocks/>
-                <a:stCxn id="5" idx="3"/>
-                <a:endCxn id="6" idx="7"/>
-              </p:cNvCxnSpPr>
-              <p:nvPr/>
-            </p:nvCxnSpPr>
-            <p:spPr>
-              <a:xfrm flipH="1">
-                <a:off x="2805900" y="1083653"/>
-                <a:ext cx="1507248" cy="857453"/>
-              </a:xfrm>
-              <a:prstGeom prst="line">
-                <a:avLst/>
-              </a:prstGeom>
-              <a:ln w="38100">
-                <a:solidFill>
-                  <a:schemeClr val="bg2">
-                    <a:lumMod val="90000"/>
+                  <a:schemeClr val="accent5">
+                    <a:lumMod val="60000"/>
+                    <a:lumOff val="40000"/>
                   </a:schemeClr>
                 </a:solidFill>
-              </a:ln>
-            </p:spPr>
-            <p:style>
-              <a:lnRef idx="1">
-                <a:schemeClr val="accent1"/>
-              </a:lnRef>
-              <a:fillRef idx="0">
-                <a:schemeClr val="accent1"/>
-              </a:fillRef>
-              <a:effectRef idx="0">
-                <a:schemeClr val="accent1"/>
-              </a:effectRef>
-              <a:fontRef idx="minor">
-                <a:schemeClr val="tx1"/>
-              </a:fontRef>
-            </p:style>
-          </p:cxnSp>
-          <p:cxnSp>
-            <p:nvCxnSpPr>
-              <p:cNvPr id="9" name="Straight Connector 8">
-                <a:extLst>
-                  <a:ext uri="{FF2B5EF4-FFF2-40B4-BE49-F238E27FC236}">
-                    <a16:creationId xmlns:a16="http://schemas.microsoft.com/office/drawing/2014/main" id="{969384A7-42A0-4A26-8046-3C89583E9B29}"/>
-                  </a:ext>
-                </a:extLst>
-              </p:cNvPr>
-              <p:cNvCxnSpPr>
-                <a:cxnSpLocks/>
-                <a:stCxn id="6" idx="3"/>
-                <a:endCxn id="7" idx="0"/>
-              </p:cNvCxnSpPr>
-              <p:nvPr/>
-            </p:nvCxnSpPr>
-            <p:spPr>
-              <a:xfrm flipH="1">
-                <a:off x="1653477" y="2296886"/>
-                <a:ext cx="796643" cy="758023"/>
-              </a:xfrm>
-              <a:prstGeom prst="line">
-                <a:avLst/>
-              </a:prstGeom>
-              <a:ln w="38100">
-                <a:solidFill>
-                  <a:schemeClr val="bg2">
-                    <a:lumMod val="90000"/>
-                  </a:schemeClr>
-                </a:solidFill>
-              </a:ln>
-            </p:spPr>
-            <p:style>
-              <a:lnRef idx="1">
-                <a:schemeClr val="accent1"/>
-              </a:lnRef>
-              <a:fillRef idx="0">
-                <a:schemeClr val="accent1"/>
-              </a:fillRef>
-              <a:effectRef idx="0">
-                <a:schemeClr val="accent1"/>
-              </a:effectRef>
-              <a:fontRef idx="minor">
-                <a:schemeClr val="tx1"/>
-              </a:fontRef>
-            </p:style>
-          </p:cxnSp>
-          <p:sp>
-            <p:nvSpPr>
-              <p:cNvPr id="10" name="Oval 9">
-                <a:extLst>
-                  <a:ext uri="{FF2B5EF4-FFF2-40B4-BE49-F238E27FC236}">
-                    <a16:creationId xmlns:a16="http://schemas.microsoft.com/office/drawing/2014/main" id="{05B8F7F1-E5B8-41BA-A287-1066237B9FF0}"/>
-                  </a:ext>
-                </a:extLst>
-              </p:cNvPr>
-              <p:cNvSpPr>
-                <a:spLocks noChangeAspect="1"/>
-              </p:cNvSpPr>
-              <p:nvPr/>
-            </p:nvSpPr>
-            <p:spPr>
-              <a:xfrm>
-                <a:off x="3376560" y="3050830"/>
-                <a:ext cx="503150" cy="503150"/>
-              </a:xfrm>
-              <a:prstGeom prst="ellipse">
-                <a:avLst/>
-              </a:prstGeom>
-              <a:noFill/>
-              <a:ln w="38100">
-                <a:solidFill>
-                  <a:schemeClr val="tx1"/>
-                </a:solidFill>
-              </a:ln>
-            </p:spPr>
-            <p:style>
-              <a:lnRef idx="2">
-                <a:schemeClr val="accent1">
-                  <a:shade val="50000"/>
+              </a:rPr>
+              <a:t>2</a:t>
+            </a:r>
+            <a:endParaRPr lang="en-IN" sz="2800" b="1" baseline="-25000" dirty="0">
+              <a:solidFill>
+                <a:schemeClr val="accent5">
+                  <a:lumMod val="60000"/>
+                  <a:lumOff val="40000"/>
                 </a:schemeClr>
-              </a:lnRef>
-              <a:fillRef idx="1">
-                <a:schemeClr val="accent1"/>
-              </a:fillRef>
-              <a:effectRef idx="0">
-                <a:schemeClr val="accent1"/>
-              </a:effectRef>
-              <a:fontRef idx="minor">
-                <a:schemeClr val="lt1"/>
-              </a:fontRef>
-            </p:style>
-            <p:txBody>
-              <a:bodyPr rtlCol="0" anchor="ctr"/>
-              <a:lstStyle/>
-              <a:p>
-                <a:pPr algn="ctr"/>
-                <a:r>
-                  <a:rPr lang="en-US" sz="2000" b="1" dirty="0">
-                    <a:solidFill>
-                      <a:prstClr val="black"/>
-                    </a:solidFill>
-                    <a:latin typeface="Calibri" panose="020F0502020204030204"/>
-                  </a:rPr>
-                  <a:t>l</a:t>
-                </a:r>
-                <a:r>
-                  <a:rPr lang="en-US" sz="2000" b="1" baseline="-25000" dirty="0">
-                    <a:solidFill>
-                      <a:prstClr val="black"/>
-                    </a:solidFill>
-                    <a:latin typeface="Calibri" panose="020F0502020204030204"/>
-                  </a:rPr>
-                  <a:t>3</a:t>
-                </a:r>
-                <a:endParaRPr lang="en-IN" sz="1400" baseline="-25000" dirty="0"/>
-              </a:p>
-            </p:txBody>
-          </p:sp>
-          <p:cxnSp>
-            <p:nvCxnSpPr>
-              <p:cNvPr id="11" name="Straight Connector 10">
-                <a:extLst>
-                  <a:ext uri="{FF2B5EF4-FFF2-40B4-BE49-F238E27FC236}">
-                    <a16:creationId xmlns:a16="http://schemas.microsoft.com/office/drawing/2014/main" id="{8734530F-2937-4F56-B68F-097FD44A3723}"/>
-                  </a:ext>
-                </a:extLst>
-              </p:cNvPr>
-              <p:cNvCxnSpPr>
-                <a:cxnSpLocks/>
-                <a:stCxn id="6" idx="5"/>
-                <a:endCxn id="10" idx="0"/>
-              </p:cNvCxnSpPr>
-              <p:nvPr/>
-            </p:nvCxnSpPr>
-            <p:spPr>
-              <a:xfrm>
-                <a:off x="2805900" y="2296886"/>
-                <a:ext cx="822235" cy="753944"/>
-              </a:xfrm>
-              <a:prstGeom prst="line">
-                <a:avLst/>
-              </a:prstGeom>
-              <a:ln w="38100">
-                <a:solidFill>
-                  <a:schemeClr val="bg2">
-                    <a:lumMod val="90000"/>
-                  </a:schemeClr>
-                </a:solidFill>
-              </a:ln>
-            </p:spPr>
-            <p:style>
-              <a:lnRef idx="1">
-                <a:schemeClr val="accent1"/>
-              </a:lnRef>
-              <a:fillRef idx="0">
-                <a:schemeClr val="accent1"/>
-              </a:fillRef>
-              <a:effectRef idx="0">
-                <a:schemeClr val="accent1"/>
-              </a:effectRef>
-              <a:fontRef idx="minor">
-                <a:schemeClr val="tx1"/>
-              </a:fontRef>
-            </p:style>
-          </p:cxnSp>
-          <p:sp>
-            <p:nvSpPr>
-              <p:cNvPr id="20" name="Oval 19">
-                <a:extLst>
-                  <a:ext uri="{FF2B5EF4-FFF2-40B4-BE49-F238E27FC236}">
-                    <a16:creationId xmlns:a16="http://schemas.microsoft.com/office/drawing/2014/main" id="{9AE2D35E-CEDA-4EF3-AB04-CCB301B5331C}"/>
-                  </a:ext>
-                </a:extLst>
-              </p:cNvPr>
-              <p:cNvSpPr>
-                <a:spLocks noChangeAspect="1"/>
-              </p:cNvSpPr>
-              <p:nvPr/>
-            </p:nvSpPr>
-            <p:spPr>
-              <a:xfrm>
-                <a:off x="671774" y="4469322"/>
-                <a:ext cx="503150" cy="503150"/>
-              </a:xfrm>
-              <a:prstGeom prst="ellipse">
-                <a:avLst/>
-              </a:prstGeom>
-              <a:noFill/>
-              <a:ln w="38100">
-                <a:solidFill>
-                  <a:schemeClr val="tx1"/>
-                </a:solidFill>
-              </a:ln>
-            </p:spPr>
-            <p:style>
-              <a:lnRef idx="2">
-                <a:schemeClr val="accent1">
-                  <a:shade val="50000"/>
-                </a:schemeClr>
-              </a:lnRef>
-              <a:fillRef idx="1">
-                <a:schemeClr val="accent1"/>
-              </a:fillRef>
-              <a:effectRef idx="0">
-                <a:schemeClr val="accent1"/>
-              </a:effectRef>
-              <a:fontRef idx="minor">
-                <a:schemeClr val="lt1"/>
-              </a:fontRef>
-            </p:style>
-            <p:txBody>
-              <a:bodyPr rtlCol="0" anchor="ctr"/>
-              <a:lstStyle/>
-              <a:p>
-                <a:pPr algn="ctr"/>
-                <a:r>
-                  <a:rPr lang="en-US" sz="2000" b="1" dirty="0">
-                    <a:solidFill>
-                      <a:prstClr val="black"/>
-                    </a:solidFill>
-                    <a:latin typeface="Calibri" panose="020F0502020204030204"/>
-                  </a:rPr>
-                  <a:t>l</a:t>
-                </a:r>
-                <a:r>
-                  <a:rPr lang="en-US" sz="2000" b="1" baseline="-25000" dirty="0">
-                    <a:solidFill>
-                      <a:prstClr val="black"/>
-                    </a:solidFill>
-                    <a:latin typeface="Calibri" panose="020F0502020204030204"/>
-                  </a:rPr>
-                  <a:t>1</a:t>
-                </a:r>
-                <a:endParaRPr lang="en-IN" sz="1400" baseline="-25000" dirty="0"/>
-              </a:p>
-            </p:txBody>
-          </p:sp>
-          <p:cxnSp>
-            <p:nvCxnSpPr>
-              <p:cNvPr id="21" name="Straight Connector 20">
-                <a:extLst>
-                  <a:ext uri="{FF2B5EF4-FFF2-40B4-BE49-F238E27FC236}">
-                    <a16:creationId xmlns:a16="http://schemas.microsoft.com/office/drawing/2014/main" id="{D304E2D1-CA82-47D1-A903-A9CF0345045C}"/>
-                  </a:ext>
-                </a:extLst>
-              </p:cNvPr>
-              <p:cNvCxnSpPr>
-                <a:cxnSpLocks/>
-                <a:stCxn id="7" idx="3"/>
-                <a:endCxn id="20" idx="0"/>
-              </p:cNvCxnSpPr>
-              <p:nvPr/>
-            </p:nvCxnSpPr>
-            <p:spPr>
-              <a:xfrm flipH="1">
-                <a:off x="923349" y="3484374"/>
-                <a:ext cx="552238" cy="984948"/>
-              </a:xfrm>
-              <a:prstGeom prst="line">
-                <a:avLst/>
-              </a:prstGeom>
-              <a:ln w="38100">
-                <a:solidFill>
-                  <a:schemeClr val="bg2">
-                    <a:lumMod val="90000"/>
-                  </a:schemeClr>
-                </a:solidFill>
-              </a:ln>
-            </p:spPr>
-            <p:style>
-              <a:lnRef idx="1">
-                <a:schemeClr val="accent1"/>
-              </a:lnRef>
-              <a:fillRef idx="0">
-                <a:schemeClr val="accent1"/>
-              </a:fillRef>
-              <a:effectRef idx="0">
-                <a:schemeClr val="accent1"/>
-              </a:effectRef>
-              <a:fontRef idx="minor">
-                <a:schemeClr val="tx1"/>
-              </a:fontRef>
-            </p:style>
-          </p:cxnSp>
-          <p:sp>
-            <p:nvSpPr>
-              <p:cNvPr id="12" name="Oval 11">
-                <a:extLst>
-                  <a:ext uri="{FF2B5EF4-FFF2-40B4-BE49-F238E27FC236}">
-                    <a16:creationId xmlns:a16="http://schemas.microsoft.com/office/drawing/2014/main" id="{61787934-1776-47B1-9A82-88D991D01AB8}"/>
-                  </a:ext>
-                </a:extLst>
-              </p:cNvPr>
-              <p:cNvSpPr>
-                <a:spLocks noChangeAspect="1"/>
-              </p:cNvSpPr>
-              <p:nvPr/>
-            </p:nvSpPr>
-            <p:spPr>
-              <a:xfrm>
-                <a:off x="2027095" y="4469322"/>
-                <a:ext cx="503150" cy="503150"/>
-              </a:xfrm>
-              <a:prstGeom prst="ellipse">
-                <a:avLst/>
-              </a:prstGeom>
-              <a:noFill/>
-              <a:ln w="38100">
-                <a:solidFill>
-                  <a:schemeClr val="tx1"/>
-                </a:solidFill>
-              </a:ln>
-            </p:spPr>
-            <p:style>
-              <a:lnRef idx="2">
-                <a:schemeClr val="accent1">
-                  <a:shade val="50000"/>
-                </a:schemeClr>
-              </a:lnRef>
-              <a:fillRef idx="1">
-                <a:schemeClr val="accent1"/>
-              </a:fillRef>
-              <a:effectRef idx="0">
-                <a:schemeClr val="accent1"/>
-              </a:effectRef>
-              <a:fontRef idx="minor">
-                <a:schemeClr val="lt1"/>
-              </a:fontRef>
-            </p:style>
-            <p:txBody>
-              <a:bodyPr rtlCol="0" anchor="ctr"/>
-              <a:lstStyle/>
-              <a:p>
-                <a:pPr algn="ctr"/>
-                <a:r>
-                  <a:rPr lang="en-US" sz="2000" b="1" dirty="0">
-                    <a:solidFill>
-                      <a:prstClr val="black"/>
-                    </a:solidFill>
-                    <a:latin typeface="Calibri" panose="020F0502020204030204"/>
-                  </a:rPr>
-                  <a:t>l</a:t>
-                </a:r>
-                <a:r>
-                  <a:rPr lang="en-US" sz="2000" b="1" baseline="-25000" dirty="0">
-                    <a:solidFill>
-                      <a:prstClr val="black"/>
-                    </a:solidFill>
-                    <a:latin typeface="Calibri" panose="020F0502020204030204"/>
-                  </a:rPr>
-                  <a:t>2</a:t>
-                </a:r>
-                <a:endParaRPr lang="en-IN" sz="1400" baseline="-25000" dirty="0"/>
-              </a:p>
-            </p:txBody>
-          </p:sp>
-          <p:cxnSp>
-            <p:nvCxnSpPr>
-              <p:cNvPr id="13" name="Straight Connector 12">
-                <a:extLst>
-                  <a:ext uri="{FF2B5EF4-FFF2-40B4-BE49-F238E27FC236}">
-                    <a16:creationId xmlns:a16="http://schemas.microsoft.com/office/drawing/2014/main" id="{472B5577-D041-42C4-B6C5-CA9A7A8E4E61}"/>
-                  </a:ext>
-                </a:extLst>
-              </p:cNvPr>
-              <p:cNvCxnSpPr>
-                <a:cxnSpLocks/>
-                <a:stCxn id="7" idx="5"/>
-                <a:endCxn id="12" idx="0"/>
-              </p:cNvCxnSpPr>
-              <p:nvPr/>
-            </p:nvCxnSpPr>
-            <p:spPr>
-              <a:xfrm>
-                <a:off x="1831367" y="3484374"/>
-                <a:ext cx="447303" cy="984948"/>
-              </a:xfrm>
-              <a:prstGeom prst="line">
-                <a:avLst/>
-              </a:prstGeom>
-              <a:ln w="38100">
-                <a:solidFill>
-                  <a:schemeClr val="bg2">
-                    <a:lumMod val="90000"/>
-                  </a:schemeClr>
-                </a:solidFill>
-              </a:ln>
-            </p:spPr>
-            <p:style>
-              <a:lnRef idx="1">
-                <a:schemeClr val="accent1"/>
-              </a:lnRef>
-              <a:fillRef idx="0">
-                <a:schemeClr val="accent1"/>
-              </a:fillRef>
-              <a:effectRef idx="0">
-                <a:schemeClr val="accent1"/>
-              </a:effectRef>
-              <a:fontRef idx="minor">
-                <a:schemeClr val="tx1"/>
-              </a:fontRef>
-            </p:style>
-          </p:cxnSp>
-          <p:cxnSp>
-            <p:nvCxnSpPr>
-              <p:cNvPr id="22" name="Straight Connector 21">
-                <a:extLst>
-                  <a:ext uri="{FF2B5EF4-FFF2-40B4-BE49-F238E27FC236}">
-                    <a16:creationId xmlns:a16="http://schemas.microsoft.com/office/drawing/2014/main" id="{6F00F4E0-5EA4-4367-A57B-717789CC8805}"/>
-                  </a:ext>
-                </a:extLst>
-              </p:cNvPr>
-              <p:cNvCxnSpPr>
-                <a:cxnSpLocks/>
-                <a:stCxn id="5" idx="5"/>
-                <a:endCxn id="23" idx="0"/>
-              </p:cNvCxnSpPr>
-              <p:nvPr/>
-            </p:nvCxnSpPr>
-            <p:spPr>
-              <a:xfrm>
-                <a:off x="4668928" y="1083653"/>
-                <a:ext cx="1378557" cy="783768"/>
-              </a:xfrm>
-              <a:prstGeom prst="line">
-                <a:avLst/>
-              </a:prstGeom>
-              <a:ln w="38100">
-                <a:solidFill>
-                  <a:schemeClr val="bg2">
-                    <a:lumMod val="90000"/>
-                  </a:schemeClr>
-                </a:solidFill>
-              </a:ln>
-            </p:spPr>
-            <p:style>
-              <a:lnRef idx="1">
-                <a:schemeClr val="accent1"/>
-              </a:lnRef>
-              <a:fillRef idx="0">
-                <a:schemeClr val="accent1"/>
-              </a:fillRef>
-              <a:effectRef idx="0">
-                <a:schemeClr val="accent1"/>
-              </a:effectRef>
-              <a:fontRef idx="minor">
-                <a:schemeClr val="tx1"/>
-              </a:fontRef>
-            </p:style>
-          </p:cxnSp>
-          <p:sp>
-            <p:nvSpPr>
-              <p:cNvPr id="23" name="Oval 22">
-                <a:extLst>
-                  <a:ext uri="{FF2B5EF4-FFF2-40B4-BE49-F238E27FC236}">
-                    <a16:creationId xmlns:a16="http://schemas.microsoft.com/office/drawing/2014/main" id="{97C7316D-B5DB-400A-B88F-F63FD56289C2}"/>
-                  </a:ext>
-                </a:extLst>
-              </p:cNvPr>
-              <p:cNvSpPr>
-                <a:spLocks noChangeAspect="1"/>
-              </p:cNvSpPr>
-              <p:nvPr/>
-            </p:nvSpPr>
-            <p:spPr>
-              <a:xfrm>
-                <a:off x="5795910" y="1867421"/>
-                <a:ext cx="503150" cy="503150"/>
-              </a:xfrm>
-              <a:prstGeom prst="ellipse">
-                <a:avLst/>
-              </a:prstGeom>
-              <a:noFill/>
-              <a:ln w="38100">
-                <a:solidFill>
-                  <a:schemeClr val="tx1"/>
-                </a:solidFill>
-              </a:ln>
-            </p:spPr>
-            <p:style>
-              <a:lnRef idx="2">
-                <a:schemeClr val="accent1">
-                  <a:shade val="50000"/>
-                </a:schemeClr>
-              </a:lnRef>
-              <a:fillRef idx="1">
-                <a:schemeClr val="accent1"/>
-              </a:fillRef>
-              <a:effectRef idx="0">
-                <a:schemeClr val="accent1"/>
-              </a:effectRef>
-              <a:fontRef idx="minor">
-                <a:schemeClr val="lt1"/>
-              </a:fontRef>
-            </p:style>
-            <p:txBody>
-              <a:bodyPr rtlCol="0" anchor="ctr"/>
-              <a:lstStyle/>
-              <a:p>
-                <a:pPr algn="ctr"/>
-                <a:r>
-                  <a:rPr lang="en-US" sz="2000" b="1" dirty="0">
-                    <a:solidFill>
-                      <a:prstClr val="black"/>
-                    </a:solidFill>
-                    <a:latin typeface="Calibri" panose="020F0502020204030204"/>
-                  </a:rPr>
-                  <a:t>0</a:t>
-                </a:r>
-                <a:endParaRPr lang="en-IN" sz="2000" b="1" dirty="0">
-                  <a:solidFill>
-                    <a:prstClr val="black"/>
-                  </a:solidFill>
-                  <a:latin typeface="Calibri" panose="020F0502020204030204"/>
-                </a:endParaRPr>
-              </a:p>
-            </p:txBody>
-          </p:sp>
-          <p:sp>
-            <p:nvSpPr>
-              <p:cNvPr id="24" name="Oval 23">
-                <a:extLst>
-                  <a:ext uri="{FF2B5EF4-FFF2-40B4-BE49-F238E27FC236}">
-                    <a16:creationId xmlns:a16="http://schemas.microsoft.com/office/drawing/2014/main" id="{3EEC87DB-322F-4762-8F0A-78F2F089E578}"/>
-                  </a:ext>
-                </a:extLst>
-              </p:cNvPr>
-              <p:cNvSpPr>
-                <a:spLocks noChangeAspect="1"/>
-              </p:cNvSpPr>
-              <p:nvPr/>
-            </p:nvSpPr>
-            <p:spPr>
-              <a:xfrm>
-                <a:off x="4840427" y="3054909"/>
-                <a:ext cx="503150" cy="503150"/>
-              </a:xfrm>
-              <a:prstGeom prst="ellipse">
-                <a:avLst/>
-              </a:prstGeom>
-              <a:noFill/>
-              <a:ln w="38100">
-                <a:solidFill>
-                  <a:schemeClr val="tx1"/>
-                </a:solidFill>
-              </a:ln>
-            </p:spPr>
-            <p:style>
-              <a:lnRef idx="2">
-                <a:schemeClr val="accent1">
-                  <a:shade val="50000"/>
-                </a:schemeClr>
-              </a:lnRef>
-              <a:fillRef idx="1">
-                <a:schemeClr val="accent1"/>
-              </a:fillRef>
-              <a:effectRef idx="0">
-                <a:schemeClr val="accent1"/>
-              </a:effectRef>
-              <a:fontRef idx="minor">
-                <a:schemeClr val="lt1"/>
-              </a:fontRef>
-            </p:style>
-            <p:txBody>
-              <a:bodyPr rtlCol="0" anchor="ctr"/>
-              <a:lstStyle/>
-              <a:p>
-                <a:pPr algn="ctr"/>
-                <a:r>
-                  <a:rPr lang="en-US" sz="2000" b="1" dirty="0">
-                    <a:solidFill>
-                      <a:prstClr val="black"/>
-                    </a:solidFill>
-                    <a:latin typeface="Calibri" panose="020F0502020204030204"/>
-                  </a:rPr>
-                  <a:t>1</a:t>
-                </a:r>
-                <a:endParaRPr lang="en-IN" sz="2000" b="1" dirty="0">
-                  <a:solidFill>
-                    <a:prstClr val="black"/>
-                  </a:solidFill>
-                  <a:latin typeface="Calibri" panose="020F0502020204030204"/>
-                </a:endParaRPr>
-              </a:p>
-            </p:txBody>
-          </p:sp>
-          <p:cxnSp>
-            <p:nvCxnSpPr>
-              <p:cNvPr id="25" name="Straight Connector 24">
-                <a:extLst>
-                  <a:ext uri="{FF2B5EF4-FFF2-40B4-BE49-F238E27FC236}">
-                    <a16:creationId xmlns:a16="http://schemas.microsoft.com/office/drawing/2014/main" id="{319F75DB-E2C5-4BEB-BB3E-19891C69C08F}"/>
-                  </a:ext>
-                </a:extLst>
-              </p:cNvPr>
-              <p:cNvCxnSpPr>
-                <a:cxnSpLocks/>
-                <a:stCxn id="23" idx="3"/>
-                <a:endCxn id="24" idx="0"/>
-              </p:cNvCxnSpPr>
-              <p:nvPr/>
-            </p:nvCxnSpPr>
-            <p:spPr>
-              <a:xfrm flipH="1">
-                <a:off x="5092002" y="2296886"/>
-                <a:ext cx="777593" cy="758023"/>
-              </a:xfrm>
-              <a:prstGeom prst="line">
-                <a:avLst/>
-              </a:prstGeom>
-              <a:ln w="38100">
-                <a:solidFill>
-                  <a:schemeClr val="bg2">
-                    <a:lumMod val="90000"/>
-                  </a:schemeClr>
-                </a:solidFill>
-              </a:ln>
-            </p:spPr>
-            <p:style>
-              <a:lnRef idx="1">
-                <a:schemeClr val="accent1"/>
-              </a:lnRef>
-              <a:fillRef idx="0">
-                <a:schemeClr val="accent1"/>
-              </a:fillRef>
-              <a:effectRef idx="0">
-                <a:schemeClr val="accent1"/>
-              </a:effectRef>
-              <a:fontRef idx="minor">
-                <a:schemeClr val="tx1"/>
-              </a:fontRef>
-            </p:style>
-          </p:cxnSp>
-          <p:sp>
-            <p:nvSpPr>
-              <p:cNvPr id="26" name="Oval 25">
-                <a:extLst>
-                  <a:ext uri="{FF2B5EF4-FFF2-40B4-BE49-F238E27FC236}">
-                    <a16:creationId xmlns:a16="http://schemas.microsoft.com/office/drawing/2014/main" id="{3E24CAD1-1225-4631-A934-8DC6582D3A00}"/>
-                  </a:ext>
-                </a:extLst>
-              </p:cNvPr>
-              <p:cNvSpPr>
-                <a:spLocks noChangeAspect="1"/>
-              </p:cNvSpPr>
-              <p:nvPr/>
-            </p:nvSpPr>
-            <p:spPr>
-              <a:xfrm>
-                <a:off x="6910335" y="3050830"/>
-                <a:ext cx="503150" cy="503150"/>
-              </a:xfrm>
-              <a:prstGeom prst="ellipse">
-                <a:avLst/>
-              </a:prstGeom>
-              <a:noFill/>
-              <a:ln w="38100">
-                <a:solidFill>
-                  <a:schemeClr val="tx1"/>
-                </a:solidFill>
-              </a:ln>
-            </p:spPr>
-            <p:style>
-              <a:lnRef idx="2">
-                <a:schemeClr val="accent1">
-                  <a:shade val="50000"/>
-                </a:schemeClr>
-              </a:lnRef>
-              <a:fillRef idx="1">
-                <a:schemeClr val="accent1"/>
-              </a:fillRef>
-              <a:effectRef idx="0">
-                <a:schemeClr val="accent1"/>
-              </a:effectRef>
-              <a:fontRef idx="minor">
-                <a:schemeClr val="lt1"/>
-              </a:fontRef>
-            </p:style>
-            <p:txBody>
-              <a:bodyPr rtlCol="0" anchor="ctr"/>
-              <a:lstStyle/>
-              <a:p>
-                <a:pPr algn="ctr"/>
-                <a:r>
-                  <a:rPr lang="en-US" sz="2000" b="1" dirty="0">
-                    <a:solidFill>
-                      <a:prstClr val="black"/>
-                    </a:solidFill>
-                    <a:latin typeface="Calibri" panose="020F0502020204030204"/>
-                  </a:rPr>
-                  <a:t>2</a:t>
-                </a:r>
-                <a:endParaRPr lang="en-IN" sz="1400" baseline="-25000" dirty="0"/>
-              </a:p>
-            </p:txBody>
-          </p:sp>
-          <p:cxnSp>
-            <p:nvCxnSpPr>
-              <p:cNvPr id="27" name="Straight Connector 26">
-                <a:extLst>
-                  <a:ext uri="{FF2B5EF4-FFF2-40B4-BE49-F238E27FC236}">
-                    <a16:creationId xmlns:a16="http://schemas.microsoft.com/office/drawing/2014/main" id="{D4823082-10E5-4063-8D02-FB0EBCD35DBD}"/>
-                  </a:ext>
-                </a:extLst>
-              </p:cNvPr>
-              <p:cNvCxnSpPr>
-                <a:cxnSpLocks/>
-                <a:stCxn id="23" idx="5"/>
-                <a:endCxn id="26" idx="0"/>
-              </p:cNvCxnSpPr>
-              <p:nvPr/>
-            </p:nvCxnSpPr>
-            <p:spPr>
-              <a:xfrm>
-                <a:off x="6225375" y="2296886"/>
-                <a:ext cx="936535" cy="753944"/>
-              </a:xfrm>
-              <a:prstGeom prst="line">
-                <a:avLst/>
-              </a:prstGeom>
-              <a:ln w="38100">
-                <a:solidFill>
-                  <a:schemeClr val="bg2">
-                    <a:lumMod val="90000"/>
-                  </a:schemeClr>
-                </a:solidFill>
-              </a:ln>
-            </p:spPr>
-            <p:style>
-              <a:lnRef idx="1">
-                <a:schemeClr val="accent1"/>
-              </a:lnRef>
-              <a:fillRef idx="0">
-                <a:schemeClr val="accent1"/>
-              </a:fillRef>
-              <a:effectRef idx="0">
-                <a:schemeClr val="accent1"/>
-              </a:effectRef>
-              <a:fontRef idx="minor">
-                <a:schemeClr val="tx1"/>
-              </a:fontRef>
-            </p:style>
-          </p:cxnSp>
-          <p:sp>
-            <p:nvSpPr>
-              <p:cNvPr id="33" name="Oval 32">
-                <a:extLst>
-                  <a:ext uri="{FF2B5EF4-FFF2-40B4-BE49-F238E27FC236}">
-                    <a16:creationId xmlns:a16="http://schemas.microsoft.com/office/drawing/2014/main" id="{B35F63D9-DB4B-4D10-871A-1A1EF72033AA}"/>
-                  </a:ext>
-                </a:extLst>
-              </p:cNvPr>
-              <p:cNvSpPr>
-                <a:spLocks noChangeAspect="1"/>
-              </p:cNvSpPr>
-              <p:nvPr/>
-            </p:nvSpPr>
-            <p:spPr>
-              <a:xfrm>
-                <a:off x="4129349" y="4469322"/>
-                <a:ext cx="503150" cy="503150"/>
-              </a:xfrm>
-              <a:prstGeom prst="ellipse">
-                <a:avLst/>
-              </a:prstGeom>
-              <a:noFill/>
-              <a:ln w="38100">
-                <a:solidFill>
-                  <a:schemeClr val="tx1"/>
-                </a:solidFill>
-              </a:ln>
-            </p:spPr>
-            <p:style>
-              <a:lnRef idx="2">
-                <a:schemeClr val="accent1">
-                  <a:shade val="50000"/>
-                </a:schemeClr>
-              </a:lnRef>
-              <a:fillRef idx="1">
-                <a:schemeClr val="accent1"/>
-              </a:fillRef>
-              <a:effectRef idx="0">
-                <a:schemeClr val="accent1"/>
-              </a:effectRef>
-              <a:fontRef idx="minor">
-                <a:schemeClr val="lt1"/>
-              </a:fontRef>
-            </p:style>
-            <p:txBody>
-              <a:bodyPr rtlCol="0" anchor="ctr"/>
-              <a:lstStyle/>
-              <a:p>
-                <a:pPr algn="ctr"/>
-                <a:r>
-                  <a:rPr lang="en-US" sz="2000" b="1" dirty="0">
-                    <a:solidFill>
-                      <a:prstClr val="black"/>
-                    </a:solidFill>
-                    <a:latin typeface="Calibri" panose="020F0502020204030204"/>
-                  </a:rPr>
-                  <a:t>l</a:t>
-                </a:r>
-                <a:r>
-                  <a:rPr lang="en-US" sz="2000" b="1" baseline="-25000" dirty="0">
-                    <a:solidFill>
-                      <a:prstClr val="black"/>
-                    </a:solidFill>
-                    <a:latin typeface="Calibri" panose="020F0502020204030204"/>
-                  </a:rPr>
-                  <a:t>4</a:t>
-                </a:r>
-                <a:endParaRPr lang="en-IN" sz="1400" baseline="-25000" dirty="0"/>
-              </a:p>
-            </p:txBody>
-          </p:sp>
-          <p:cxnSp>
-            <p:nvCxnSpPr>
-              <p:cNvPr id="34" name="Straight Connector 33">
-                <a:extLst>
-                  <a:ext uri="{FF2B5EF4-FFF2-40B4-BE49-F238E27FC236}">
-                    <a16:creationId xmlns:a16="http://schemas.microsoft.com/office/drawing/2014/main" id="{1E00399F-F557-481C-B7AB-EE04A35753BB}"/>
-                  </a:ext>
-                </a:extLst>
-              </p:cNvPr>
-              <p:cNvCxnSpPr>
-                <a:cxnSpLocks/>
-                <a:stCxn id="24" idx="3"/>
-                <a:endCxn id="33" idx="0"/>
-              </p:cNvCxnSpPr>
-              <p:nvPr/>
-            </p:nvCxnSpPr>
-            <p:spPr>
-              <a:xfrm flipH="1">
-                <a:off x="4380924" y="3484374"/>
-                <a:ext cx="533188" cy="984948"/>
-              </a:xfrm>
-              <a:prstGeom prst="line">
-                <a:avLst/>
-              </a:prstGeom>
-              <a:ln w="38100">
-                <a:solidFill>
-                  <a:schemeClr val="bg2">
-                    <a:lumMod val="90000"/>
-                  </a:schemeClr>
-                </a:solidFill>
-              </a:ln>
-            </p:spPr>
-            <p:style>
-              <a:lnRef idx="1">
-                <a:schemeClr val="accent1"/>
-              </a:lnRef>
-              <a:fillRef idx="0">
-                <a:schemeClr val="accent1"/>
-              </a:fillRef>
-              <a:effectRef idx="0">
-                <a:schemeClr val="accent1"/>
-              </a:effectRef>
-              <a:fontRef idx="minor">
-                <a:schemeClr val="tx1"/>
-              </a:fontRef>
-            </p:style>
-          </p:cxnSp>
-          <p:sp>
-            <p:nvSpPr>
-              <p:cNvPr id="35" name="Oval 34">
-                <a:extLst>
-                  <a:ext uri="{FF2B5EF4-FFF2-40B4-BE49-F238E27FC236}">
-                    <a16:creationId xmlns:a16="http://schemas.microsoft.com/office/drawing/2014/main" id="{634B2D6B-9E86-4541-8140-4B9FB4A9F7DD}"/>
-                  </a:ext>
-                </a:extLst>
-              </p:cNvPr>
-              <p:cNvSpPr>
-                <a:spLocks noChangeAspect="1"/>
-              </p:cNvSpPr>
-              <p:nvPr/>
-            </p:nvSpPr>
-            <p:spPr>
-              <a:xfrm>
-                <a:off x="5494195" y="4469322"/>
-                <a:ext cx="503150" cy="503150"/>
-              </a:xfrm>
-              <a:prstGeom prst="ellipse">
-                <a:avLst/>
-              </a:prstGeom>
-              <a:noFill/>
-              <a:ln w="38100">
-                <a:solidFill>
-                  <a:schemeClr val="tx1"/>
-                </a:solidFill>
-              </a:ln>
-            </p:spPr>
-            <p:style>
-              <a:lnRef idx="2">
-                <a:schemeClr val="accent1">
-                  <a:shade val="50000"/>
-                </a:schemeClr>
-              </a:lnRef>
-              <a:fillRef idx="1">
-                <a:schemeClr val="accent1"/>
-              </a:fillRef>
-              <a:effectRef idx="0">
-                <a:schemeClr val="accent1"/>
-              </a:effectRef>
-              <a:fontRef idx="minor">
-                <a:schemeClr val="lt1"/>
-              </a:fontRef>
-            </p:style>
-            <p:txBody>
-              <a:bodyPr rtlCol="0" anchor="ctr"/>
-              <a:lstStyle/>
-              <a:p>
-                <a:pPr algn="ctr"/>
-                <a:r>
-                  <a:rPr lang="en-US" sz="2000" b="1" dirty="0">
-                    <a:solidFill>
-                      <a:prstClr val="black"/>
-                    </a:solidFill>
-                    <a:latin typeface="Calibri" panose="020F0502020204030204"/>
-                  </a:rPr>
-                  <a:t>l</a:t>
-                </a:r>
-                <a:r>
-                  <a:rPr lang="en-US" sz="2000" b="1" baseline="-25000" dirty="0">
-                    <a:solidFill>
-                      <a:prstClr val="black"/>
-                    </a:solidFill>
-                    <a:latin typeface="Calibri" panose="020F0502020204030204"/>
-                  </a:rPr>
-                  <a:t>5</a:t>
-                </a:r>
-                <a:endParaRPr lang="en-IN" sz="1400" baseline="-25000" dirty="0"/>
-              </a:p>
-            </p:txBody>
-          </p:sp>
-          <p:cxnSp>
-            <p:nvCxnSpPr>
-              <p:cNvPr id="36" name="Straight Connector 35">
-                <a:extLst>
-                  <a:ext uri="{FF2B5EF4-FFF2-40B4-BE49-F238E27FC236}">
-                    <a16:creationId xmlns:a16="http://schemas.microsoft.com/office/drawing/2014/main" id="{C2A8E1C3-B711-4828-BB5F-63B841A050D6}"/>
-                  </a:ext>
-                </a:extLst>
-              </p:cNvPr>
-              <p:cNvCxnSpPr>
-                <a:cxnSpLocks/>
-                <a:stCxn id="24" idx="5"/>
-                <a:endCxn id="35" idx="0"/>
-              </p:cNvCxnSpPr>
-              <p:nvPr/>
-            </p:nvCxnSpPr>
-            <p:spPr>
-              <a:xfrm>
-                <a:off x="5269892" y="3484374"/>
-                <a:ext cx="475878" cy="984948"/>
-              </a:xfrm>
-              <a:prstGeom prst="line">
-                <a:avLst/>
-              </a:prstGeom>
-              <a:ln w="38100">
-                <a:solidFill>
-                  <a:schemeClr val="bg2">
-                    <a:lumMod val="90000"/>
-                  </a:schemeClr>
-                </a:solidFill>
-              </a:ln>
-            </p:spPr>
-            <p:style>
-              <a:lnRef idx="1">
-                <a:schemeClr val="accent1"/>
-              </a:lnRef>
-              <a:fillRef idx="0">
-                <a:schemeClr val="accent1"/>
-              </a:fillRef>
-              <a:effectRef idx="0">
-                <a:schemeClr val="accent1"/>
-              </a:effectRef>
-              <a:fontRef idx="minor">
-                <a:schemeClr val="tx1"/>
-              </a:fontRef>
-            </p:style>
-          </p:cxnSp>
-          <p:sp>
-            <p:nvSpPr>
-              <p:cNvPr id="39" name="Oval 38">
-                <a:extLst>
-                  <a:ext uri="{FF2B5EF4-FFF2-40B4-BE49-F238E27FC236}">
-                    <a16:creationId xmlns:a16="http://schemas.microsoft.com/office/drawing/2014/main" id="{06AAD07B-4702-4E18-8F5E-3DD3B789B64D}"/>
-                  </a:ext>
-                </a:extLst>
-              </p:cNvPr>
-              <p:cNvSpPr>
-                <a:spLocks noChangeAspect="1"/>
-              </p:cNvSpPr>
-              <p:nvPr/>
-            </p:nvSpPr>
-            <p:spPr>
-              <a:xfrm>
-                <a:off x="6205799" y="4469322"/>
-                <a:ext cx="503150" cy="503150"/>
-              </a:xfrm>
-              <a:prstGeom prst="ellipse">
-                <a:avLst/>
-              </a:prstGeom>
-              <a:noFill/>
-              <a:ln w="38100">
-                <a:solidFill>
-                  <a:schemeClr val="tx1"/>
-                </a:solidFill>
-              </a:ln>
-            </p:spPr>
-            <p:style>
-              <a:lnRef idx="2">
-                <a:schemeClr val="accent1">
-                  <a:shade val="50000"/>
-                </a:schemeClr>
-              </a:lnRef>
-              <a:fillRef idx="1">
-                <a:schemeClr val="accent1"/>
-              </a:fillRef>
-              <a:effectRef idx="0">
-                <a:schemeClr val="accent1"/>
-              </a:effectRef>
-              <a:fontRef idx="minor">
-                <a:schemeClr val="lt1"/>
-              </a:fontRef>
-            </p:style>
-            <p:txBody>
-              <a:bodyPr rtlCol="0" anchor="ctr"/>
-              <a:lstStyle/>
-              <a:p>
-                <a:pPr algn="ctr"/>
-                <a:r>
-                  <a:rPr lang="en-US" sz="2000" b="1" dirty="0">
-                    <a:solidFill>
-                      <a:prstClr val="black"/>
-                    </a:solidFill>
-                    <a:latin typeface="Calibri" panose="020F0502020204030204"/>
-                  </a:rPr>
-                  <a:t>l</a:t>
-                </a:r>
-                <a:r>
-                  <a:rPr lang="en-US" sz="2000" b="1" baseline="-25000" dirty="0">
-                    <a:solidFill>
-                      <a:prstClr val="black"/>
-                    </a:solidFill>
-                    <a:latin typeface="Calibri" panose="020F0502020204030204"/>
-                  </a:rPr>
-                  <a:t>6</a:t>
-                </a:r>
-                <a:endParaRPr lang="en-IN" sz="1400" baseline="-25000" dirty="0"/>
-              </a:p>
-            </p:txBody>
-          </p:sp>
-          <p:cxnSp>
-            <p:nvCxnSpPr>
-              <p:cNvPr id="40" name="Straight Connector 39">
-                <a:extLst>
-                  <a:ext uri="{FF2B5EF4-FFF2-40B4-BE49-F238E27FC236}">
-                    <a16:creationId xmlns:a16="http://schemas.microsoft.com/office/drawing/2014/main" id="{F3AB8360-D6E0-45F7-AEED-5A7540429710}"/>
-                  </a:ext>
-                </a:extLst>
-              </p:cNvPr>
-              <p:cNvCxnSpPr>
-                <a:cxnSpLocks/>
-                <a:endCxn id="39" idx="0"/>
-              </p:cNvCxnSpPr>
-              <p:nvPr/>
-            </p:nvCxnSpPr>
-            <p:spPr>
-              <a:xfrm flipH="1">
-                <a:off x="6457374" y="3484374"/>
-                <a:ext cx="533188" cy="984948"/>
-              </a:xfrm>
-              <a:prstGeom prst="line">
-                <a:avLst/>
-              </a:prstGeom>
-              <a:ln w="38100">
-                <a:solidFill>
-                  <a:schemeClr val="bg2">
-                    <a:lumMod val="90000"/>
-                  </a:schemeClr>
-                </a:solidFill>
-              </a:ln>
-            </p:spPr>
-            <p:style>
-              <a:lnRef idx="1">
-                <a:schemeClr val="accent1"/>
-              </a:lnRef>
-              <a:fillRef idx="0">
-                <a:schemeClr val="accent1"/>
-              </a:fillRef>
-              <a:effectRef idx="0">
-                <a:schemeClr val="accent1"/>
-              </a:effectRef>
-              <a:fontRef idx="minor">
-                <a:schemeClr val="tx1"/>
-              </a:fontRef>
-            </p:style>
-          </p:cxnSp>
-          <p:sp>
-            <p:nvSpPr>
-              <p:cNvPr id="41" name="Oval 40">
-                <a:extLst>
-                  <a:ext uri="{FF2B5EF4-FFF2-40B4-BE49-F238E27FC236}">
-                    <a16:creationId xmlns:a16="http://schemas.microsoft.com/office/drawing/2014/main" id="{E16550BF-4E2C-4633-B77A-BE0875108AAE}"/>
-                  </a:ext>
-                </a:extLst>
-              </p:cNvPr>
-              <p:cNvSpPr>
-                <a:spLocks noChangeAspect="1"/>
-              </p:cNvSpPr>
-              <p:nvPr/>
-            </p:nvSpPr>
-            <p:spPr>
-              <a:xfrm>
-                <a:off x="7570645" y="4469322"/>
-                <a:ext cx="503150" cy="503150"/>
-              </a:xfrm>
-              <a:prstGeom prst="ellipse">
-                <a:avLst/>
-              </a:prstGeom>
-              <a:noFill/>
-              <a:ln w="38100">
-                <a:solidFill>
-                  <a:schemeClr val="tx1"/>
-                </a:solidFill>
-              </a:ln>
-            </p:spPr>
-            <p:style>
-              <a:lnRef idx="2">
-                <a:schemeClr val="accent1">
-                  <a:shade val="50000"/>
-                </a:schemeClr>
-              </a:lnRef>
-              <a:fillRef idx="1">
-                <a:schemeClr val="accent1"/>
-              </a:fillRef>
-              <a:effectRef idx="0">
-                <a:schemeClr val="accent1"/>
-              </a:effectRef>
-              <a:fontRef idx="minor">
-                <a:schemeClr val="lt1"/>
-              </a:fontRef>
-            </p:style>
-            <p:txBody>
-              <a:bodyPr rtlCol="0" anchor="ctr"/>
-              <a:lstStyle/>
-              <a:p>
-                <a:pPr algn="ctr"/>
-                <a:r>
-                  <a:rPr lang="en-US" sz="2000" b="1" dirty="0">
-                    <a:solidFill>
-                      <a:prstClr val="black"/>
-                    </a:solidFill>
-                    <a:latin typeface="Calibri" panose="020F0502020204030204"/>
-                  </a:rPr>
-                  <a:t>l</a:t>
-                </a:r>
-                <a:r>
-                  <a:rPr lang="en-US" sz="2000" b="1" baseline="-25000" dirty="0">
-                    <a:solidFill>
-                      <a:prstClr val="black"/>
-                    </a:solidFill>
-                    <a:latin typeface="Calibri" panose="020F0502020204030204"/>
-                  </a:rPr>
-                  <a:t>7</a:t>
-                </a:r>
-                <a:endParaRPr lang="en-IN" sz="1400" baseline="-25000" dirty="0"/>
-              </a:p>
-            </p:txBody>
-          </p:sp>
-          <p:cxnSp>
-            <p:nvCxnSpPr>
-              <p:cNvPr id="42" name="Straight Connector 41">
-                <a:extLst>
-                  <a:ext uri="{FF2B5EF4-FFF2-40B4-BE49-F238E27FC236}">
-                    <a16:creationId xmlns:a16="http://schemas.microsoft.com/office/drawing/2014/main" id="{0A18AB53-D305-472E-86CB-94FB9BF06F96}"/>
-                  </a:ext>
-                </a:extLst>
-              </p:cNvPr>
-              <p:cNvCxnSpPr>
-                <a:cxnSpLocks/>
-                <a:endCxn id="41" idx="0"/>
-              </p:cNvCxnSpPr>
-              <p:nvPr/>
-            </p:nvCxnSpPr>
-            <p:spPr>
-              <a:xfrm>
-                <a:off x="7346342" y="3484374"/>
-                <a:ext cx="475878" cy="984948"/>
-              </a:xfrm>
-              <a:prstGeom prst="line">
-                <a:avLst/>
-              </a:prstGeom>
-              <a:ln w="38100">
-                <a:solidFill>
-                  <a:schemeClr val="bg2">
-                    <a:lumMod val="90000"/>
-                  </a:schemeClr>
-                </a:solidFill>
-              </a:ln>
-            </p:spPr>
-            <p:style>
-              <a:lnRef idx="1">
-                <a:schemeClr val="accent1"/>
-              </a:lnRef>
-              <a:fillRef idx="0">
-                <a:schemeClr val="accent1"/>
-              </a:fillRef>
-              <a:effectRef idx="0">
-                <a:schemeClr val="accent1"/>
-              </a:effectRef>
-              <a:fontRef idx="minor">
-                <a:schemeClr val="tx1"/>
-              </a:fontRef>
-            </p:style>
-          </p:cxnSp>
-          <p:sp>
-            <p:nvSpPr>
-              <p:cNvPr id="44" name="TextBox 43">
-                <a:extLst>
-                  <a:ext uri="{FF2B5EF4-FFF2-40B4-BE49-F238E27FC236}">
-                    <a16:creationId xmlns:a16="http://schemas.microsoft.com/office/drawing/2014/main" id="{E95D731A-343F-4558-9CF5-AA3CC006C3D3}"/>
-                  </a:ext>
-                </a:extLst>
-              </p:cNvPr>
-              <p:cNvSpPr txBox="1"/>
-              <p:nvPr/>
-            </p:nvSpPr>
-            <p:spPr>
-              <a:xfrm>
-                <a:off x="2222686" y="867859"/>
-                <a:ext cx="534988" cy="523220"/>
-              </a:xfrm>
-              <a:prstGeom prst="rect">
-                <a:avLst/>
-              </a:prstGeom>
-              <a:noFill/>
-            </p:spPr>
-            <p:txBody>
-              <a:bodyPr wrap="square" rtlCol="0">
-                <a:spAutoFit/>
-              </a:bodyPr>
-              <a:lstStyle/>
-              <a:p>
-                <a:r>
-                  <a:rPr lang="en-US" sz="2800" b="1" dirty="0">
-                    <a:solidFill>
-                      <a:schemeClr val="accent6">
-                        <a:lumMod val="60000"/>
-                        <a:lumOff val="40000"/>
-                      </a:schemeClr>
-                    </a:solidFill>
-                  </a:rPr>
-                  <a:t>T</a:t>
-                </a:r>
-                <a:r>
-                  <a:rPr lang="en-US" sz="2800" b="1" baseline="-25000" dirty="0">
-                    <a:solidFill>
-                      <a:schemeClr val="accent6">
-                        <a:lumMod val="60000"/>
-                        <a:lumOff val="40000"/>
-                      </a:schemeClr>
-                    </a:solidFill>
-                  </a:rPr>
-                  <a:t>1</a:t>
-                </a:r>
-                <a:endParaRPr lang="en-IN" sz="2800" b="1" baseline="-25000" dirty="0">
-                  <a:solidFill>
-                    <a:schemeClr val="accent6">
-                      <a:lumMod val="60000"/>
-                      <a:lumOff val="40000"/>
-                    </a:schemeClr>
-                  </a:solidFill>
-                </a:endParaRPr>
-              </a:p>
-            </p:txBody>
-          </p:sp>
-          <p:sp>
-            <p:nvSpPr>
-              <p:cNvPr id="45" name="TextBox 44">
-                <a:extLst>
-                  <a:ext uri="{FF2B5EF4-FFF2-40B4-BE49-F238E27FC236}">
-                    <a16:creationId xmlns:a16="http://schemas.microsoft.com/office/drawing/2014/main" id="{2D38512E-8398-4CD2-9794-C3C09D4C2857}"/>
-                  </a:ext>
-                </a:extLst>
-              </p:cNvPr>
-              <p:cNvSpPr txBox="1"/>
-              <p:nvPr/>
-            </p:nvSpPr>
-            <p:spPr>
-              <a:xfrm>
-                <a:off x="6723968" y="1718102"/>
-                <a:ext cx="534988" cy="523220"/>
-              </a:xfrm>
-              <a:prstGeom prst="rect">
-                <a:avLst/>
-              </a:prstGeom>
-              <a:noFill/>
-            </p:spPr>
-            <p:txBody>
-              <a:bodyPr wrap="square" rtlCol="0">
-                <a:spAutoFit/>
-              </a:bodyPr>
-              <a:lstStyle/>
-              <a:p>
-                <a:r>
-                  <a:rPr lang="en-US" sz="2800" b="1" dirty="0">
-                    <a:solidFill>
-                      <a:schemeClr val="accent5">
-                        <a:lumMod val="60000"/>
-                        <a:lumOff val="40000"/>
-                      </a:schemeClr>
-                    </a:solidFill>
-                  </a:rPr>
-                  <a:t>T</a:t>
-                </a:r>
-                <a:r>
-                  <a:rPr lang="en-US" sz="2800" b="1" baseline="-25000" dirty="0">
-                    <a:solidFill>
-                      <a:schemeClr val="accent5">
-                        <a:lumMod val="60000"/>
-                        <a:lumOff val="40000"/>
-                      </a:schemeClr>
-                    </a:solidFill>
-                  </a:rPr>
-                  <a:t>2</a:t>
-                </a:r>
-                <a:endParaRPr lang="en-IN" sz="2800" b="1" baseline="-25000" dirty="0">
-                  <a:solidFill>
-                    <a:schemeClr val="accent5">
-                      <a:lumMod val="60000"/>
-                      <a:lumOff val="40000"/>
-                    </a:schemeClr>
-                  </a:solidFill>
-                </a:endParaRPr>
-              </a:p>
-            </p:txBody>
-          </p:sp>
-        </p:grpSp>
-      </p:grpSp>
+              </a:solidFill>
+            </a:endParaRPr>
+          </a:p>
+        </p:txBody>
+      </p:sp>
       <p:sp>
         <p:nvSpPr>
           <p:cNvPr id="48" name="Arrow: Right 47">
@@ -6591,7 +6486,7 @@
         </p:nvSpPr>
         <p:spPr>
           <a:xfrm>
-            <a:off x="8867775" y="3105150"/>
+            <a:off x="8449933" y="2063991"/>
             <a:ext cx="876300" cy="1152525"/>
           </a:xfrm>
           <a:prstGeom prst="rightArrow">
@@ -6626,6 +6521,71 @@
           <a:p>
             <a:pPr algn="ctr"/>
             <a:endParaRPr lang="en-IN"/>
+          </a:p>
+        </p:txBody>
+      </p:sp>
+      <p:sp>
+        <p:nvSpPr>
+          <p:cNvPr id="26" name="Oval 25">
+            <a:extLst>
+              <a:ext uri="{FF2B5EF4-FFF2-40B4-BE49-F238E27FC236}">
+                <a16:creationId xmlns:a16="http://schemas.microsoft.com/office/drawing/2014/main" id="{3E24CAD1-1225-4631-A934-8DC6582D3A00}"/>
+              </a:ext>
+            </a:extLst>
+          </p:cNvPr>
+          <p:cNvSpPr>
+            <a:spLocks noChangeAspect="1"/>
+          </p:cNvSpPr>
+          <p:nvPr/>
+        </p:nvSpPr>
+        <p:spPr>
+          <a:xfrm>
+            <a:off x="7205610" y="3247400"/>
+            <a:ext cx="503150" cy="503150"/>
+          </a:xfrm>
+          <a:prstGeom prst="ellipse">
+            <a:avLst/>
+          </a:prstGeom>
+          <a:solidFill>
+            <a:schemeClr val="bg1"/>
+          </a:solidFill>
+          <a:ln w="38100">
+            <a:solidFill>
+              <a:schemeClr val="tx1"/>
+            </a:solidFill>
+          </a:ln>
+        </p:spPr>
+        <p:style>
+          <a:lnRef idx="2">
+            <a:schemeClr val="accent1">
+              <a:shade val="50000"/>
+            </a:schemeClr>
+          </a:lnRef>
+          <a:fillRef idx="1">
+            <a:schemeClr val="accent1"/>
+          </a:fillRef>
+          <a:effectRef idx="0">
+            <a:schemeClr val="accent1"/>
+          </a:effectRef>
+          <a:fontRef idx="minor">
+            <a:schemeClr val="lt1"/>
+          </a:fontRef>
+        </p:style>
+        <p:txBody>
+          <a:bodyPr rtlCol="0" anchor="ctr"/>
+          <a:lstStyle/>
+          <a:p>
+            <a:pPr algn="ctr"/>
+            <a:r>
+              <a:rPr lang="en-US" sz="2000" b="1" dirty="0">
+                <a:solidFill>
+                  <a:prstClr val="black"/>
+                </a:solidFill>
+                <a:latin typeface="Calibri" panose="020F0502020204030204"/>
+              </a:rPr>
+              <a:t>2</a:t>
+            </a:r>
+            <a:endParaRPr lang="en-IN" sz="1400" baseline="-25000" dirty="0"/>
           </a:p>
         </p:txBody>
       </p:sp>

</xml_diff>